<commit_message>
New PPT for DB, EJB3.1 and some img
</commit_message>
<xml_diff>
--- a/PPT/Java Transaction Design Strategies.pptx
+++ b/PPT/Java Transaction Design Strategies.pptx
@@ -5,33 +5,34 @@
     <p:sldMasterId id="2147483649" r:id="rId1"/>
   </p:sldMasterIdLst>
   <p:notesMasterIdLst>
-    <p:notesMasterId r:id="rId23"/>
+    <p:notesMasterId r:id="rId24"/>
   </p:notesMasterIdLst>
   <p:handoutMasterIdLst>
-    <p:handoutMasterId r:id="rId24"/>
+    <p:handoutMasterId r:id="rId25"/>
   </p:handoutMasterIdLst>
   <p:sldIdLst>
     <p:sldId id="1000" r:id="rId2"/>
     <p:sldId id="1484" r:id="rId3"/>
-    <p:sldId id="1487" r:id="rId4"/>
-    <p:sldId id="1486" r:id="rId5"/>
-    <p:sldId id="1488" r:id="rId6"/>
-    <p:sldId id="1489" r:id="rId7"/>
-    <p:sldId id="1490" r:id="rId8"/>
-    <p:sldId id="1491" r:id="rId9"/>
-    <p:sldId id="1492" r:id="rId10"/>
-    <p:sldId id="1493" r:id="rId11"/>
-    <p:sldId id="1494" r:id="rId12"/>
-    <p:sldId id="1495" r:id="rId13"/>
-    <p:sldId id="1496" r:id="rId14"/>
-    <p:sldId id="1497" r:id="rId15"/>
-    <p:sldId id="1498" r:id="rId16"/>
-    <p:sldId id="1503" r:id="rId17"/>
-    <p:sldId id="1499" r:id="rId18"/>
-    <p:sldId id="1500" r:id="rId19"/>
-    <p:sldId id="1501" r:id="rId20"/>
-    <p:sldId id="1502" r:id="rId21"/>
-    <p:sldId id="1485" r:id="rId22"/>
+    <p:sldId id="1504" r:id="rId4"/>
+    <p:sldId id="1487" r:id="rId5"/>
+    <p:sldId id="1486" r:id="rId6"/>
+    <p:sldId id="1488" r:id="rId7"/>
+    <p:sldId id="1489" r:id="rId8"/>
+    <p:sldId id="1490" r:id="rId9"/>
+    <p:sldId id="1491" r:id="rId10"/>
+    <p:sldId id="1492" r:id="rId11"/>
+    <p:sldId id="1493" r:id="rId12"/>
+    <p:sldId id="1494" r:id="rId13"/>
+    <p:sldId id="1495" r:id="rId14"/>
+    <p:sldId id="1496" r:id="rId15"/>
+    <p:sldId id="1497" r:id="rId16"/>
+    <p:sldId id="1498" r:id="rId17"/>
+    <p:sldId id="1503" r:id="rId18"/>
+    <p:sldId id="1499" r:id="rId19"/>
+    <p:sldId id="1500" r:id="rId20"/>
+    <p:sldId id="1501" r:id="rId21"/>
+    <p:sldId id="1502" r:id="rId22"/>
+    <p:sldId id="1485" r:id="rId23"/>
   </p:sldIdLst>
   <p:sldSz cx="9144000" cy="6858000" type="screen4x3"/>
   <p:notesSz cx="6888163" cy="10020300"/>
@@ -284,7 +285,7 @@
               <a:pPr>
                 <a:defRPr/>
               </a:pPr>
-              <a:t>1/20/2017</a:t>
+              <a:t>3/17/2017</a:t>
             </a:fld>
             <a:endParaRPr lang="en-GB"/>
           </a:p>
@@ -1081,7 +1082,7 @@
               <a:pPr>
                 <a:defRPr/>
               </a:pPr>
-              <a:t>15</a:t>
+              <a:t>16</a:t>
             </a:fld>
             <a:endParaRPr lang="fr-FR"/>
           </a:p>
@@ -2031,7 +2032,7 @@
               <a:pPr>
                 <a:defRPr/>
               </a:pPr>
-              <a:t>16</a:t>
+              <a:t>17</a:t>
             </a:fld>
             <a:endParaRPr lang="fr-FR"/>
           </a:p>
@@ -5553,6 +5554,306 @@
           </a:p>
         </p:txBody>
       </p:sp>
+      <p:pic>
+        <p:nvPicPr>
+          <p:cNvPr id="6" name="Picture 5"/>
+          <p:cNvPicPr>
+            <a:picLocks noChangeAspect="1"/>
+          </p:cNvPicPr>
+          <p:nvPr/>
+        </p:nvPicPr>
+        <p:blipFill>
+          <a:blip r:embed="rId2"/>
+          <a:stretch>
+            <a:fillRect/>
+          </a:stretch>
+        </p:blipFill>
+        <p:spPr>
+          <a:xfrm>
+            <a:off x="539552" y="332656"/>
+            <a:ext cx="3629025" cy="5000625"/>
+          </a:xfrm>
+          <a:prstGeom prst="rect">
+            <a:avLst/>
+          </a:prstGeom>
+        </p:spPr>
+      </p:pic>
+      <p:sp>
+        <p:nvSpPr>
+          <p:cNvPr id="7" name="TextBox 6"/>
+          <p:cNvSpPr txBox="1"/>
+          <p:nvPr/>
+        </p:nvSpPr>
+        <p:spPr>
+          <a:xfrm>
+            <a:off x="611560" y="5445224"/>
+            <a:ext cx="3600400" cy="369332"/>
+          </a:xfrm>
+          <a:prstGeom prst="rect">
+            <a:avLst/>
+          </a:prstGeom>
+          <a:noFill/>
+        </p:spPr>
+        <p:txBody>
+          <a:bodyPr wrap="square" rtlCol="0">
+            <a:spAutoFit/>
+          </a:bodyPr>
+          <a:lstStyle/>
+          <a:p>
+            <a:pPr marL="0" lvl="1"/>
+            <a:r>
+              <a:rPr lang="en-US" dirty="0" smtClean="0">
+                <a:solidFill>
+                  <a:srgbClr val="0070C0"/>
+                </a:solidFill>
+                <a:sym typeface="Wingdings" panose="05000000000000000000" pitchFamily="2" charset="2"/>
+              </a:rPr>
+              <a:t>TransactionReadUncommitted</a:t>
+            </a:r>
+            <a:endParaRPr lang="en-US" dirty="0">
+              <a:solidFill>
+                <a:srgbClr val="0070C0"/>
+              </a:solidFill>
+              <a:sym typeface="Wingdings" panose="05000000000000000000" pitchFamily="2" charset="2"/>
+            </a:endParaRPr>
+          </a:p>
+        </p:txBody>
+      </p:sp>
+      <p:sp>
+        <p:nvSpPr>
+          <p:cNvPr id="8" name="Rectangle 7"/>
+          <p:cNvSpPr/>
+          <p:nvPr/>
+        </p:nvSpPr>
+        <p:spPr>
+          <a:xfrm>
+            <a:off x="445852" y="332656"/>
+            <a:ext cx="3816424" cy="5760640"/>
+          </a:xfrm>
+          <a:prstGeom prst="rect">
+            <a:avLst/>
+          </a:prstGeom>
+          <a:noFill/>
+          <a:ln w="3175"/>
+        </p:spPr>
+        <p:style>
+          <a:lnRef idx="2">
+            <a:schemeClr val="accent1">
+              <a:shade val="50000"/>
+            </a:schemeClr>
+          </a:lnRef>
+          <a:fillRef idx="1">
+            <a:schemeClr val="accent1"/>
+          </a:fillRef>
+          <a:effectRef idx="0">
+            <a:schemeClr val="accent1"/>
+          </a:effectRef>
+          <a:fontRef idx="minor">
+            <a:schemeClr val="lt1"/>
+          </a:fontRef>
+        </p:style>
+        <p:txBody>
+          <a:bodyPr rtlCol="0" anchor="ctr"/>
+          <a:lstStyle/>
+          <a:p>
+            <a:pPr algn="ctr"/>
+            <a:endParaRPr lang="en-US"/>
+          </a:p>
+        </p:txBody>
+      </p:sp>
+      <p:sp>
+        <p:nvSpPr>
+          <p:cNvPr id="9" name="Rectangle 8"/>
+          <p:cNvSpPr/>
+          <p:nvPr/>
+        </p:nvSpPr>
+        <p:spPr>
+          <a:xfrm>
+            <a:off x="4767534" y="335444"/>
+            <a:ext cx="3816424" cy="5760640"/>
+          </a:xfrm>
+          <a:prstGeom prst="rect">
+            <a:avLst/>
+          </a:prstGeom>
+          <a:noFill/>
+          <a:ln w="3175"/>
+        </p:spPr>
+        <p:style>
+          <a:lnRef idx="2">
+            <a:schemeClr val="accent1">
+              <a:shade val="50000"/>
+            </a:schemeClr>
+          </a:lnRef>
+          <a:fillRef idx="1">
+            <a:schemeClr val="accent1"/>
+          </a:fillRef>
+          <a:effectRef idx="0">
+            <a:schemeClr val="accent1"/>
+          </a:effectRef>
+          <a:fontRef idx="minor">
+            <a:schemeClr val="lt1"/>
+          </a:fontRef>
+        </p:style>
+        <p:txBody>
+          <a:bodyPr rtlCol="0" anchor="ctr"/>
+          <a:lstStyle/>
+          <a:p>
+            <a:pPr algn="ctr"/>
+            <a:endParaRPr lang="en-US"/>
+          </a:p>
+        </p:txBody>
+      </p:sp>
+      <p:pic>
+        <p:nvPicPr>
+          <p:cNvPr id="10" name="Picture 9"/>
+          <p:cNvPicPr>
+            <a:picLocks noChangeAspect="1"/>
+          </p:cNvPicPr>
+          <p:nvPr/>
+        </p:nvPicPr>
+        <p:blipFill>
+          <a:blip r:embed="rId3"/>
+          <a:stretch>
+            <a:fillRect/>
+          </a:stretch>
+        </p:blipFill>
+        <p:spPr>
+          <a:xfrm>
+            <a:off x="4848200" y="406074"/>
+            <a:ext cx="3655092" cy="4927207"/>
+          </a:xfrm>
+          <a:prstGeom prst="rect">
+            <a:avLst/>
+          </a:prstGeom>
+        </p:spPr>
+      </p:pic>
+      <p:sp>
+        <p:nvSpPr>
+          <p:cNvPr id="11" name="TextBox 10"/>
+          <p:cNvSpPr txBox="1"/>
+          <p:nvPr/>
+        </p:nvSpPr>
+        <p:spPr>
+          <a:xfrm>
+            <a:off x="5076056" y="5464444"/>
+            <a:ext cx="3600400" cy="369332"/>
+          </a:xfrm>
+          <a:prstGeom prst="rect">
+            <a:avLst/>
+          </a:prstGeom>
+          <a:noFill/>
+        </p:spPr>
+        <p:txBody>
+          <a:bodyPr wrap="square" rtlCol="0">
+            <a:spAutoFit/>
+          </a:bodyPr>
+          <a:lstStyle/>
+          <a:p>
+            <a:pPr marL="0" lvl="1"/>
+            <a:r>
+              <a:rPr lang="en-US" dirty="0">
+                <a:solidFill>
+                  <a:srgbClr val="0070C0"/>
+                </a:solidFill>
+                <a:sym typeface="Wingdings" panose="05000000000000000000" pitchFamily="2" charset="2"/>
+              </a:rPr>
+              <a:t>TransactionReadCommitted</a:t>
+            </a:r>
+          </a:p>
+        </p:txBody>
+      </p:sp>
+    </p:spTree>
+    <p:extLst>
+      <p:ext uri="{BB962C8B-B14F-4D97-AF65-F5344CB8AC3E}">
+        <p14:creationId xmlns:p14="http://schemas.microsoft.com/office/powerpoint/2010/main" val="2138425649"/>
+      </p:ext>
+    </p:extLst>
+  </p:cSld>
+  <p:clrMapOvr>
+    <a:masterClrMapping/>
+  </p:clrMapOvr>
+  <p:timing>
+    <p:tnLst>
+      <p:par>
+        <p:cTn id="1" dur="indefinite" restart="never" nodeType="tmRoot"/>
+      </p:par>
+    </p:tnLst>
+  </p:timing>
+</p:sld>
+</file>
+
+<file path=ppt/slides/slide11.xml><?xml version="1.0" encoding="utf-8"?>
+<p:sld xmlns:a="http://schemas.openxmlformats.org/drawingml/2006/main" xmlns:r="http://schemas.openxmlformats.org/officeDocument/2006/relationships" xmlns:p="http://schemas.openxmlformats.org/presentationml/2006/main">
+  <p:cSld>
+    <p:spTree>
+      <p:nvGrpSpPr>
+        <p:cNvPr id="1" name=""/>
+        <p:cNvGrpSpPr/>
+        <p:nvPr/>
+      </p:nvGrpSpPr>
+      <p:grpSpPr>
+        <a:xfrm>
+          <a:off x="0" y="0"/>
+          <a:ext cx="0" cy="0"/>
+          <a:chOff x="0" y="0"/>
+          <a:chExt cx="0" cy="0"/>
+        </a:xfrm>
+      </p:grpSpPr>
+      <p:sp>
+        <p:nvSpPr>
+          <p:cNvPr id="4" name="Slide Number Placeholder 3"/>
+          <p:cNvSpPr>
+            <a:spLocks noGrp="1"/>
+          </p:cNvSpPr>
+          <p:nvPr>
+            <p:ph type="sldNum" sz="quarter" idx="10"/>
+          </p:nvPr>
+        </p:nvSpPr>
+        <p:spPr/>
+        <p:txBody>
+          <a:bodyPr/>
+          <a:lstStyle/>
+          <a:p>
+            <a:pPr>
+              <a:defRPr/>
+            </a:pPr>
+            <a:fld id="{924122BF-7BF8-427C-B7B6-4209414200B1}" type="slidenum">
+              <a:rPr lang="en-US" smtClean="0"/>
+              <a:pPr>
+                <a:defRPr/>
+              </a:pPr>
+              <a:t>11</a:t>
+            </a:fld>
+            <a:endParaRPr lang="en-US"/>
+          </a:p>
+        </p:txBody>
+      </p:sp>
+      <p:sp>
+        <p:nvSpPr>
+          <p:cNvPr id="5" name="Footer Placeholder 4"/>
+          <p:cNvSpPr>
+            <a:spLocks noGrp="1"/>
+          </p:cNvSpPr>
+          <p:nvPr>
+            <p:ph type="ftr" sz="quarter" idx="11"/>
+          </p:nvPr>
+        </p:nvSpPr>
+        <p:spPr/>
+        <p:txBody>
+          <a:bodyPr/>
+          <a:lstStyle/>
+          <a:p>
+            <a:pPr>
+              <a:defRPr/>
+            </a:pPr>
+            <a:r>
+              <a:rPr lang="en-US" smtClean="0"/>
+              <a:t>Gemalto Private</a:t>
+            </a:r>
+            <a:endParaRPr lang="en-US"/>
+          </a:p>
+        </p:txBody>
+      </p:sp>
       <p:sp>
         <p:nvSpPr>
           <p:cNvPr id="7" name="TextBox 6"/>
@@ -5765,229 +6066,13 @@
   <p:clrMapOvr>
     <a:masterClrMapping/>
   </p:clrMapOvr>
-</p:sld>
-</file>
-
-<file path=ppt/slides/slide11.xml><?xml version="1.0" encoding="utf-8"?>
-<p:sld xmlns:a="http://schemas.openxmlformats.org/drawingml/2006/main" xmlns:r="http://schemas.openxmlformats.org/officeDocument/2006/relationships" xmlns:p="http://schemas.openxmlformats.org/presentationml/2006/main">
-  <p:cSld>
-    <p:spTree>
-      <p:nvGrpSpPr>
-        <p:cNvPr id="1" name=""/>
-        <p:cNvGrpSpPr/>
-        <p:nvPr/>
-      </p:nvGrpSpPr>
-      <p:grpSpPr>
-        <a:xfrm>
-          <a:off x="0" y="0"/>
-          <a:ext cx="0" cy="0"/>
-          <a:chOff x="0" y="0"/>
-          <a:chExt cx="0" cy="0"/>
-        </a:xfrm>
-      </p:grpSpPr>
-      <p:sp>
-        <p:nvSpPr>
-          <p:cNvPr id="2" name="Title 1"/>
-          <p:cNvSpPr>
-            <a:spLocks noGrp="1"/>
-          </p:cNvSpPr>
-          <p:nvPr>
-            <p:ph type="title"/>
-          </p:nvPr>
-        </p:nvSpPr>
-        <p:spPr/>
-        <p:txBody>
-          <a:bodyPr/>
-          <a:lstStyle/>
-          <a:p>
-            <a:r>
-              <a:rPr lang="en-US" dirty="0" smtClean="0"/>
-              <a:t>XA Transaction Processing</a:t>
-            </a:r>
-            <a:endParaRPr lang="en-US" dirty="0"/>
-          </a:p>
-        </p:txBody>
-      </p:sp>
-      <p:sp>
-        <p:nvSpPr>
-          <p:cNvPr id="3" name="Content Placeholder 2"/>
-          <p:cNvSpPr>
-            <a:spLocks noGrp="1"/>
-          </p:cNvSpPr>
-          <p:nvPr>
-            <p:ph idx="1"/>
-          </p:nvPr>
-        </p:nvSpPr>
-        <p:spPr>
-          <a:xfrm>
-            <a:off x="790574" y="1446213"/>
-            <a:ext cx="8245921" cy="4646612"/>
-          </a:xfrm>
-        </p:spPr>
-        <p:txBody>
-          <a:bodyPr>
-            <a:normAutofit lnSpcReduction="10000"/>
-          </a:bodyPr>
-          <a:lstStyle/>
-          <a:p>
-            <a:r>
-              <a:rPr lang="en-US" dirty="0" smtClean="0"/>
-              <a:t>XA(</a:t>
-            </a:r>
-            <a:r>
-              <a:rPr lang="en-US" dirty="0" err="1" smtClean="0"/>
-              <a:t>eXtended</a:t>
-            </a:r>
-            <a:r>
-              <a:rPr lang="en-US" dirty="0" smtClean="0"/>
-              <a:t> </a:t>
-            </a:r>
-            <a:r>
-              <a:rPr lang="en-US" dirty="0"/>
-              <a:t>Architecture)</a:t>
-            </a:r>
-            <a:r>
-              <a:rPr lang="en-US" dirty="0" smtClean="0"/>
-              <a:t> Transaction</a:t>
-            </a:r>
-          </a:p>
-          <a:p>
-            <a:endParaRPr lang="en-US" dirty="0"/>
-          </a:p>
-          <a:p>
-            <a:r>
-              <a:rPr lang="en-US" dirty="0" smtClean="0"/>
-              <a:t>Two-Phase Commit</a:t>
-            </a:r>
-          </a:p>
-          <a:p>
-            <a:pPr lvl="1"/>
-            <a:r>
-              <a:rPr lang="en-US" dirty="0" smtClean="0"/>
-              <a:t>The Prepare Phase and the Commit Phase</a:t>
-            </a:r>
-          </a:p>
-          <a:p>
-            <a:pPr lvl="1"/>
-            <a:r>
-              <a:rPr lang="en-US" dirty="0" smtClean="0"/>
-              <a:t>Multi-thread the polling process in Phase 1 and commit process in Phase 2</a:t>
-            </a:r>
-          </a:p>
-          <a:p>
-            <a:endParaRPr lang="en-US" dirty="0"/>
-          </a:p>
-          <a:p>
-            <a:r>
-              <a:rPr lang="en-US" dirty="0" smtClean="0"/>
-              <a:t>Last Participant Support</a:t>
-            </a:r>
-          </a:p>
-          <a:p>
-            <a:pPr lvl="1"/>
-            <a:r>
-              <a:rPr lang="en-US" dirty="0" smtClean="0"/>
-              <a:t>AKA. Last Resource Commit Optimization</a:t>
-            </a:r>
-          </a:p>
-          <a:p>
-            <a:pPr lvl="1"/>
-            <a:r>
-              <a:rPr lang="en-US" dirty="0" smtClean="0"/>
-              <a:t>Allows a resource that not under XA to participate in the global transaction</a:t>
-            </a:r>
-          </a:p>
-          <a:p>
-            <a:pPr lvl="1"/>
-            <a:r>
-              <a:rPr lang="en-US" dirty="0" smtClean="0"/>
-              <a:t>A request will be sent to the non-XA participant once the results (ready or not ready) from XA participants are returned and tallied the transaction manager; the outcome will direct the rest of the two-phase commit process</a:t>
-            </a:r>
-          </a:p>
-          <a:p>
-            <a:endParaRPr lang="en-US" dirty="0"/>
-          </a:p>
-          <a:p>
-            <a:r>
-              <a:rPr lang="en-US" dirty="0" smtClean="0"/>
-              <a:t>One-Phase Commit Optimization</a:t>
-            </a:r>
-          </a:p>
-          <a:p>
-            <a:pPr lvl="1"/>
-            <a:r>
-              <a:rPr lang="en-US" dirty="0" smtClean="0"/>
-              <a:t>Phase one will be bypassed</a:t>
-            </a:r>
-            <a:endParaRPr lang="en-US" dirty="0"/>
-          </a:p>
-        </p:txBody>
-      </p:sp>
-      <p:sp>
-        <p:nvSpPr>
-          <p:cNvPr id="4" name="Slide Number Placeholder 3"/>
-          <p:cNvSpPr>
-            <a:spLocks noGrp="1"/>
-          </p:cNvSpPr>
-          <p:nvPr>
-            <p:ph type="sldNum" sz="quarter" idx="10"/>
-          </p:nvPr>
-        </p:nvSpPr>
-        <p:spPr/>
-        <p:txBody>
-          <a:bodyPr/>
-          <a:lstStyle/>
-          <a:p>
-            <a:pPr>
-              <a:defRPr/>
-            </a:pPr>
-            <a:fld id="{924122BF-7BF8-427C-B7B6-4209414200B1}" type="slidenum">
-              <a:rPr lang="en-US" smtClean="0"/>
-              <a:pPr>
-                <a:defRPr/>
-              </a:pPr>
-              <a:t>11</a:t>
-            </a:fld>
-            <a:endParaRPr lang="en-US"/>
-          </a:p>
-        </p:txBody>
-      </p:sp>
-      <p:sp>
-        <p:nvSpPr>
-          <p:cNvPr id="5" name="Footer Placeholder 4"/>
-          <p:cNvSpPr>
-            <a:spLocks noGrp="1"/>
-          </p:cNvSpPr>
-          <p:nvPr>
-            <p:ph type="ftr" sz="quarter" idx="11"/>
-          </p:nvPr>
-        </p:nvSpPr>
-        <p:spPr/>
-        <p:txBody>
-          <a:bodyPr/>
-          <a:lstStyle/>
-          <a:p>
-            <a:pPr>
-              <a:defRPr/>
-            </a:pPr>
-            <a:r>
-              <a:rPr lang="en-US" smtClean="0"/>
-              <a:t>Gemalto Private</a:t>
-            </a:r>
-            <a:endParaRPr lang="en-US"/>
-          </a:p>
-        </p:txBody>
-      </p:sp>
-    </p:spTree>
-    <p:extLst>
-      <p:ext uri="{BB962C8B-B14F-4D97-AF65-F5344CB8AC3E}">
-        <p14:creationId xmlns:p14="http://schemas.microsoft.com/office/powerpoint/2010/main" val="3815486457"/>
-      </p:ext>
-    </p:extLst>
-  </p:cSld>
-  <p:clrMapOvr>
-    <a:masterClrMapping/>
-  </p:clrMapOvr>
+  <p:timing>
+    <p:tnLst>
+      <p:par>
+        <p:cTn id="1" dur="indefinite" restart="never" nodeType="tmRoot"/>
+      </p:par>
+    </p:tnLst>
+  </p:timing>
 </p:sld>
 </file>
 
@@ -6025,7 +6110,7 @@
           <a:p>
             <a:r>
               <a:rPr lang="en-US" dirty="0" smtClean="0"/>
-              <a:t>Heuristic Exception Processing</a:t>
+              <a:t>XA Transaction Processing</a:t>
             </a:r>
             <a:endParaRPr lang="en-US" dirty="0"/>
           </a:p>
@@ -6048,12 +6133,30 @@
           </a:xfrm>
         </p:spPr>
         <p:txBody>
-          <a:bodyPr/>
+          <a:bodyPr>
+            <a:normAutofit lnSpcReduction="10000"/>
+          </a:bodyPr>
           <a:lstStyle/>
           <a:p>
             <a:r>
               <a:rPr lang="en-US" dirty="0" smtClean="0"/>
-              <a:t>Only occur under XA during the two-phase commit process</a:t>
+              <a:t>XA(</a:t>
+            </a:r>
+            <a:r>
+              <a:rPr lang="en-US" dirty="0" err="1" smtClean="0"/>
+              <a:t>eXtended</a:t>
+            </a:r>
+            <a:r>
+              <a:rPr lang="en-US" dirty="0" smtClean="0"/>
+              <a:t> </a:t>
+            </a:r>
+            <a:r>
+              <a:rPr lang="en-US" dirty="0"/>
+              <a:t>Architecture)</a:t>
+            </a:r>
+            <a:r>
+              <a:rPr lang="en-US" dirty="0" smtClean="0"/>
+              <a:t> Transaction</a:t>
             </a:r>
           </a:p>
           <a:p>
@@ -6062,35 +6165,51 @@
           <a:p>
             <a:r>
               <a:rPr lang="en-US" dirty="0" smtClean="0"/>
-              <a:t>The source of the problem</a:t>
+              <a:t>Two-Phase Commit</a:t>
             </a:r>
           </a:p>
           <a:p>
             <a:pPr lvl="1"/>
             <a:r>
               <a:rPr lang="en-US" dirty="0" smtClean="0"/>
-              <a:t>Transaction timeout</a:t>
+              <a:t>The Prepare Phase and the Commit Phase</a:t>
             </a:r>
           </a:p>
           <a:p>
             <a:pPr lvl="1"/>
             <a:r>
               <a:rPr lang="en-US" dirty="0" smtClean="0"/>
-              <a:t>Resource locking</a:t>
+              <a:t>Multi-thread the polling process in Phase 1 and commit process in Phase 2</a:t>
+            </a:r>
+          </a:p>
+          <a:p>
+            <a:endParaRPr lang="en-US" dirty="0"/>
+          </a:p>
+          <a:p>
+            <a:r>
+              <a:rPr lang="en-US" dirty="0" smtClean="0"/>
+              <a:t>Last Participant Support</a:t>
             </a:r>
           </a:p>
           <a:p>
             <a:pPr lvl="1"/>
             <a:r>
               <a:rPr lang="en-US" dirty="0" smtClean="0"/>
-              <a:t>Resource overloading</a:t>
+              <a:t>AKA. Last Resource Commit Optimization</a:t>
             </a:r>
           </a:p>
           <a:p>
             <a:pPr lvl="1"/>
             <a:r>
               <a:rPr lang="en-US" dirty="0" smtClean="0"/>
-              <a:t>Network latency or network problems</a:t>
+              <a:t>Allows a resource that not under XA to participate in the global transaction</a:t>
+            </a:r>
+          </a:p>
+          <a:p>
+            <a:pPr lvl="1"/>
+            <a:r>
+              <a:rPr lang="en-US" dirty="0" smtClean="0"/>
+              <a:t>A request will be sent to the non-XA participant once the results (ready or not ready) from XA participants are returned and tallied the transaction manager; the outcome will direct the rest of the two-phase commit process</a:t>
             </a:r>
           </a:p>
           <a:p>
@@ -6099,35 +6218,15 @@
           <a:p>
             <a:r>
               <a:rPr lang="en-US" dirty="0" smtClean="0"/>
-              <a:t>JTA Heuristic Exceptions</a:t>
+              <a:t>One-Phase Commit Optimization</a:t>
             </a:r>
           </a:p>
           <a:p>
             <a:pPr lvl="1"/>
             <a:r>
-              <a:rPr lang="en-US" dirty="0" err="1" smtClean="0"/>
-              <a:t>HeuristicRollbackException</a:t>
-            </a:r>
-            <a:endParaRPr lang="en-US" dirty="0" smtClean="0"/>
-          </a:p>
-          <a:p>
-            <a:pPr lvl="1"/>
-            <a:r>
-              <a:rPr lang="en-US" dirty="0" err="1" smtClean="0"/>
-              <a:t>HeuristicCommitException</a:t>
-            </a:r>
-            <a:endParaRPr lang="en-US" dirty="0" smtClean="0"/>
-          </a:p>
-          <a:p>
-            <a:pPr lvl="1"/>
-            <a:r>
-              <a:rPr lang="en-US" dirty="0" err="1" smtClean="0"/>
-              <a:t>HeuristicMixedException</a:t>
-            </a:r>
-            <a:endParaRPr lang="en-US" dirty="0" smtClean="0"/>
-          </a:p>
-          <a:p>
-            <a:pPr lvl="1"/>
+              <a:rPr lang="en-US" dirty="0" smtClean="0"/>
+              <a:t>Phase one will be bypassed</a:t>
+            </a:r>
             <a:endParaRPr lang="en-US" dirty="0"/>
           </a:p>
         </p:txBody>
@@ -6190,13 +6289,20 @@
     </p:spTree>
     <p:extLst>
       <p:ext uri="{BB962C8B-B14F-4D97-AF65-F5344CB8AC3E}">
-        <p14:creationId xmlns:p14="http://schemas.microsoft.com/office/powerpoint/2010/main" val="3585564192"/>
+        <p14:creationId xmlns:p14="http://schemas.microsoft.com/office/powerpoint/2010/main" val="3815486457"/>
       </p:ext>
     </p:extLst>
   </p:cSld>
   <p:clrMapOvr>
     <a:masterClrMapping/>
   </p:clrMapOvr>
+  <p:timing>
+    <p:tnLst>
+      <p:par>
+        <p:cTn id="1" dur="indefinite" restart="never" nodeType="tmRoot"/>
+      </p:par>
+    </p:tnLst>
+  </p:timing>
 </p:sld>
 </file>
 
@@ -6227,10 +6333,33 @@
             <p:ph type="title"/>
           </p:nvPr>
         </p:nvSpPr>
+        <p:spPr/>
+        <p:txBody>
+          <a:bodyPr/>
+          <a:lstStyle/>
+          <a:p>
+            <a:r>
+              <a:rPr lang="en-US" dirty="0" smtClean="0"/>
+              <a:t>Heuristic Exception Processing</a:t>
+            </a:r>
+            <a:endParaRPr lang="en-US" dirty="0"/>
+          </a:p>
+        </p:txBody>
+      </p:sp>
+      <p:sp>
+        <p:nvSpPr>
+          <p:cNvPr id="3" name="Content Placeholder 2"/>
+          <p:cNvSpPr>
+            <a:spLocks noGrp="1"/>
+          </p:cNvSpPr>
+          <p:nvPr>
+            <p:ph idx="1"/>
+          </p:nvPr>
+        </p:nvSpPr>
         <p:spPr>
           <a:xfrm>
-            <a:off x="538162" y="401638"/>
-            <a:ext cx="7418213" cy="550862"/>
+            <a:off x="790574" y="1446213"/>
+            <a:ext cx="8245921" cy="4646612"/>
           </a:xfrm>
         </p:spPr>
         <p:txBody>
@@ -6238,13 +6367,82 @@
           <a:lstStyle/>
           <a:p>
             <a:r>
+              <a:rPr lang="en-US" dirty="0" smtClean="0"/>
+              <a:t>Only occur under XA during the two-phase commit process</a:t>
+            </a:r>
+          </a:p>
+          <a:p>
+            <a:endParaRPr lang="en-US" dirty="0"/>
+          </a:p>
+          <a:p>
+            <a:r>
+              <a:rPr lang="en-US" dirty="0" smtClean="0"/>
+              <a:t>The source of the problem</a:t>
+            </a:r>
+          </a:p>
+          <a:p>
+            <a:pPr lvl="1"/>
+            <a:r>
+              <a:rPr lang="en-US" dirty="0" smtClean="0"/>
+              <a:t>Transaction timeout</a:t>
+            </a:r>
+          </a:p>
+          <a:p>
+            <a:pPr lvl="1"/>
+            <a:r>
+              <a:rPr lang="en-US" dirty="0" smtClean="0"/>
+              <a:t>Resource locking</a:t>
+            </a:r>
+          </a:p>
+          <a:p>
+            <a:pPr lvl="1"/>
+            <a:r>
+              <a:rPr lang="en-US" dirty="0" smtClean="0"/>
+              <a:t>Resource overloading</a:t>
+            </a:r>
+          </a:p>
+          <a:p>
+            <a:pPr lvl="1"/>
+            <a:r>
+              <a:rPr lang="en-US" dirty="0" smtClean="0"/>
+              <a:t>Network latency or network problems</a:t>
+            </a:r>
+          </a:p>
+          <a:p>
+            <a:endParaRPr lang="en-US" dirty="0"/>
+          </a:p>
+          <a:p>
+            <a:r>
+              <a:rPr lang="en-US" dirty="0" smtClean="0"/>
+              <a:t>JTA Heuristic Exceptions</a:t>
+            </a:r>
+          </a:p>
+          <a:p>
+            <a:pPr lvl="1"/>
+            <a:r>
               <a:rPr lang="en-US" dirty="0" err="1" smtClean="0"/>
               <a:t>HeuristicRollbackException</a:t>
             </a:r>
-            <a:r>
-              <a:rPr lang="en-US" dirty="0" smtClean="0"/>
-              <a:t> during commit operation</a:t>
-            </a:r>
+            <a:endParaRPr lang="en-US" dirty="0" smtClean="0"/>
+          </a:p>
+          <a:p>
+            <a:pPr lvl="1"/>
+            <a:r>
+              <a:rPr lang="en-US" dirty="0" err="1" smtClean="0"/>
+              <a:t>HeuristicCommitException</a:t>
+            </a:r>
+            <a:endParaRPr lang="en-US" dirty="0" smtClean="0"/>
+          </a:p>
+          <a:p>
+            <a:pPr lvl="1"/>
+            <a:r>
+              <a:rPr lang="en-US" dirty="0" err="1" smtClean="0"/>
+              <a:t>HeuristicMixedException</a:t>
+            </a:r>
+            <a:endParaRPr lang="en-US" dirty="0" smtClean="0"/>
+          </a:p>
+          <a:p>
+            <a:pPr lvl="1"/>
             <a:endParaRPr lang="en-US" dirty="0"/>
           </a:p>
         </p:txBody>
@@ -6273,6 +6471,130 @@
                 <a:defRPr/>
               </a:pPr>
               <a:t>13</a:t>
+            </a:fld>
+            <a:endParaRPr lang="en-US"/>
+          </a:p>
+        </p:txBody>
+      </p:sp>
+      <p:sp>
+        <p:nvSpPr>
+          <p:cNvPr id="5" name="Footer Placeholder 4"/>
+          <p:cNvSpPr>
+            <a:spLocks noGrp="1"/>
+          </p:cNvSpPr>
+          <p:nvPr>
+            <p:ph type="ftr" sz="quarter" idx="11"/>
+          </p:nvPr>
+        </p:nvSpPr>
+        <p:spPr/>
+        <p:txBody>
+          <a:bodyPr/>
+          <a:lstStyle/>
+          <a:p>
+            <a:pPr>
+              <a:defRPr/>
+            </a:pPr>
+            <a:r>
+              <a:rPr lang="en-US" smtClean="0"/>
+              <a:t>Gemalto Private</a:t>
+            </a:r>
+            <a:endParaRPr lang="en-US"/>
+          </a:p>
+        </p:txBody>
+      </p:sp>
+    </p:spTree>
+    <p:extLst>
+      <p:ext uri="{BB962C8B-B14F-4D97-AF65-F5344CB8AC3E}">
+        <p14:creationId xmlns:p14="http://schemas.microsoft.com/office/powerpoint/2010/main" val="3585564192"/>
+      </p:ext>
+    </p:extLst>
+  </p:cSld>
+  <p:clrMapOvr>
+    <a:masterClrMapping/>
+  </p:clrMapOvr>
+  <p:timing>
+    <p:tnLst>
+      <p:par>
+        <p:cTn id="1" dur="indefinite" restart="never" nodeType="tmRoot"/>
+      </p:par>
+    </p:tnLst>
+  </p:timing>
+</p:sld>
+</file>
+
+<file path=ppt/slides/slide14.xml><?xml version="1.0" encoding="utf-8"?>
+<p:sld xmlns:a="http://schemas.openxmlformats.org/drawingml/2006/main" xmlns:r="http://schemas.openxmlformats.org/officeDocument/2006/relationships" xmlns:p="http://schemas.openxmlformats.org/presentationml/2006/main">
+  <p:cSld>
+    <p:spTree>
+      <p:nvGrpSpPr>
+        <p:cNvPr id="1" name=""/>
+        <p:cNvGrpSpPr/>
+        <p:nvPr/>
+      </p:nvGrpSpPr>
+      <p:grpSpPr>
+        <a:xfrm>
+          <a:off x="0" y="0"/>
+          <a:ext cx="0" cy="0"/>
+          <a:chOff x="0" y="0"/>
+          <a:chExt cx="0" cy="0"/>
+        </a:xfrm>
+      </p:grpSpPr>
+      <p:sp>
+        <p:nvSpPr>
+          <p:cNvPr id="2" name="Title 1"/>
+          <p:cNvSpPr>
+            <a:spLocks noGrp="1"/>
+          </p:cNvSpPr>
+          <p:nvPr>
+            <p:ph type="title"/>
+          </p:nvPr>
+        </p:nvSpPr>
+        <p:spPr>
+          <a:xfrm>
+            <a:off x="538162" y="401638"/>
+            <a:ext cx="7418213" cy="550862"/>
+          </a:xfrm>
+        </p:spPr>
+        <p:txBody>
+          <a:bodyPr/>
+          <a:lstStyle/>
+          <a:p>
+            <a:r>
+              <a:rPr lang="en-US" dirty="0" err="1" smtClean="0"/>
+              <a:t>HeuristicRollbackException</a:t>
+            </a:r>
+            <a:r>
+              <a:rPr lang="en-US" dirty="0" smtClean="0"/>
+              <a:t> during commit operation</a:t>
+            </a:r>
+            <a:endParaRPr lang="en-US" dirty="0"/>
+          </a:p>
+        </p:txBody>
+      </p:sp>
+      <p:sp>
+        <p:nvSpPr>
+          <p:cNvPr id="4" name="Slide Number Placeholder 3"/>
+          <p:cNvSpPr>
+            <a:spLocks noGrp="1"/>
+          </p:cNvSpPr>
+          <p:nvPr>
+            <p:ph type="sldNum" sz="quarter" idx="10"/>
+          </p:nvPr>
+        </p:nvSpPr>
+        <p:spPr/>
+        <p:txBody>
+          <a:bodyPr/>
+          <a:lstStyle/>
+          <a:p>
+            <a:pPr>
+              <a:defRPr/>
+            </a:pPr>
+            <a:fld id="{924122BF-7BF8-427C-B7B6-4209414200B1}" type="slidenum">
+              <a:rPr lang="en-US" smtClean="0"/>
+              <a:pPr>
+                <a:defRPr/>
+              </a:pPr>
+              <a:t>14</a:t>
             </a:fld>
             <a:endParaRPr lang="en-US"/>
           </a:p>
@@ -6470,10 +6792,17 @@
   <p:clrMapOvr>
     <a:masterClrMapping/>
   </p:clrMapOvr>
+  <p:timing>
+    <p:tnLst>
+      <p:par>
+        <p:cTn id="1" dur="indefinite" restart="never" nodeType="tmRoot"/>
+      </p:par>
+    </p:tnLst>
+  </p:timing>
 </p:sld>
 </file>
 
-<file path=ppt/slides/slide14.xml><?xml version="1.0" encoding="utf-8"?>
+<file path=ppt/slides/slide15.xml><?xml version="1.0" encoding="utf-8"?>
 <p:sld xmlns:a="http://schemas.openxmlformats.org/drawingml/2006/main" xmlns:r="http://schemas.openxmlformats.org/officeDocument/2006/relationships" xmlns:p="http://schemas.openxmlformats.org/presentationml/2006/main">
   <p:cSld>
     <p:spTree>
@@ -6539,7 +6868,7 @@
               <a:pPr>
                 <a:defRPr/>
               </a:pPr>
-              <a:t>14</a:t>
+              <a:t>15</a:t>
             </a:fld>
             <a:endParaRPr lang="en-US"/>
           </a:p>
@@ -6737,10 +7066,17 @@
   <p:clrMapOvr>
     <a:masterClrMapping/>
   </p:clrMapOvr>
+  <p:timing>
+    <p:tnLst>
+      <p:par>
+        <p:cTn id="1" dur="indefinite" restart="never" nodeType="tmRoot"/>
+      </p:par>
+    </p:tnLst>
+  </p:timing>
 </p:sld>
 </file>
 
-<file path=ppt/slides/slide15.xml><?xml version="1.0" encoding="utf-8"?>
+<file path=ppt/slides/slide16.xml><?xml version="1.0" encoding="utf-8"?>
 <p:sld xmlns:a="http://schemas.openxmlformats.org/drawingml/2006/main" xmlns:r="http://schemas.openxmlformats.org/officeDocument/2006/relationships" xmlns:p="http://schemas.openxmlformats.org/presentationml/2006/main">
   <p:cSld>
     <p:spTree>
@@ -6921,7 +7257,7 @@
               <a:pPr>
                 <a:defRPr/>
               </a:pPr>
-              <a:t>15</a:t>
+              <a:t>16</a:t>
             </a:fld>
             <a:endParaRPr lang="en-US"/>
           </a:p>
@@ -6987,10 +7323,17 @@
   <p:clrMapOvr>
     <a:masterClrMapping/>
   </p:clrMapOvr>
+  <p:timing>
+    <p:tnLst>
+      <p:par>
+        <p:cTn id="1" dur="indefinite" restart="never" nodeType="tmRoot"/>
+      </p:par>
+    </p:tnLst>
+  </p:timing>
 </p:sld>
 </file>
 
-<file path=ppt/slides/slide16.xml><?xml version="1.0" encoding="utf-8"?>
+<file path=ppt/slides/slide17.xml><?xml version="1.0" encoding="utf-8"?>
 <p:sld xmlns:a="http://schemas.openxmlformats.org/drawingml/2006/main" xmlns:r="http://schemas.openxmlformats.org/officeDocument/2006/relationships" xmlns:p="http://schemas.openxmlformats.org/presentationml/2006/main">
   <p:cSld>
     <p:spTree>
@@ -7075,7 +7418,7 @@
               <a:pPr>
                 <a:defRPr/>
               </a:pPr>
-              <a:t>16</a:t>
+              <a:t>17</a:t>
             </a:fld>
             <a:endParaRPr lang="en-US"/>
           </a:p>
@@ -7147,196 +7490,13 @@
   <p:clrMapOvr>
     <a:masterClrMapping/>
   </p:clrMapOvr>
-</p:sld>
-</file>
-
-<file path=ppt/slides/slide17.xml><?xml version="1.0" encoding="utf-8"?>
-<p:sld xmlns:a="http://schemas.openxmlformats.org/drawingml/2006/main" xmlns:r="http://schemas.openxmlformats.org/officeDocument/2006/relationships" xmlns:p="http://schemas.openxmlformats.org/presentationml/2006/main">
-  <p:cSld>
-    <p:spTree>
-      <p:nvGrpSpPr>
-        <p:cNvPr id="1" name=""/>
-        <p:cNvGrpSpPr/>
-        <p:nvPr/>
-      </p:nvGrpSpPr>
-      <p:grpSpPr>
-        <a:xfrm>
-          <a:off x="0" y="0"/>
-          <a:ext cx="0" cy="0"/>
-          <a:chOff x="0" y="0"/>
-          <a:chExt cx="0" cy="0"/>
-        </a:xfrm>
-      </p:grpSpPr>
-      <p:sp>
-        <p:nvSpPr>
-          <p:cNvPr id="2" name="Title 1"/>
-          <p:cNvSpPr>
-            <a:spLocks noGrp="1"/>
-          </p:cNvSpPr>
-          <p:nvPr>
-            <p:ph type="title"/>
-          </p:nvPr>
-        </p:nvSpPr>
-        <p:spPr/>
-        <p:txBody>
-          <a:bodyPr/>
-          <a:lstStyle/>
-          <a:p>
-            <a:r>
-              <a:rPr lang="en-US" dirty="0" smtClean="0"/>
-              <a:t>Transaction Design Patterns</a:t>
-            </a:r>
-            <a:endParaRPr lang="en-US" dirty="0"/>
-          </a:p>
-        </p:txBody>
-      </p:sp>
-      <p:sp>
-        <p:nvSpPr>
-          <p:cNvPr id="3" name="Content Placeholder 2"/>
-          <p:cNvSpPr>
-            <a:spLocks noGrp="1"/>
-          </p:cNvSpPr>
-          <p:nvPr>
-            <p:ph idx="1"/>
-          </p:nvPr>
-        </p:nvSpPr>
-        <p:spPr>
-          <a:xfrm>
-            <a:off x="790574" y="1446213"/>
-            <a:ext cx="8245921" cy="4646612"/>
-          </a:xfrm>
-        </p:spPr>
-        <p:txBody>
-          <a:bodyPr/>
-          <a:lstStyle/>
-          <a:p>
-            <a:r>
-              <a:rPr lang="en-US" dirty="0" smtClean="0"/>
-              <a:t>Client Owner Transaction Design Pattern</a:t>
-            </a:r>
-          </a:p>
-          <a:p>
-            <a:pPr lvl="1"/>
-            <a:r>
-              <a:rPr lang="en-US" dirty="0" smtClean="0"/>
-              <a:t>Case: require to manage transactions in presentation layer (</a:t>
-            </a:r>
-            <a:r>
-              <a:rPr lang="en-US" dirty="0"/>
-              <a:t>remote </a:t>
-            </a:r>
-            <a:r>
-              <a:rPr lang="en-US" dirty="0" smtClean="0"/>
-              <a:t>access)</a:t>
-            </a:r>
-          </a:p>
-          <a:p>
-            <a:pPr lvl="1"/>
-            <a:r>
-              <a:rPr lang="en-US" dirty="0" smtClean="0"/>
-              <a:t>Case: non-remote applications that contain local fine-grained service objects</a:t>
-            </a:r>
-          </a:p>
-          <a:p>
-            <a:endParaRPr lang="en-US" dirty="0" smtClean="0"/>
-          </a:p>
-          <a:p>
-            <a:r>
-              <a:rPr lang="en-US" dirty="0" smtClean="0"/>
-              <a:t>Domain Service Owner Transaction Design Pattern</a:t>
-            </a:r>
-          </a:p>
-          <a:p>
-            <a:pPr lvl="1"/>
-            <a:r>
-              <a:rPr lang="en-US" dirty="0" smtClean="0"/>
-              <a:t>Relies on the Declarative Transaction Model</a:t>
-            </a:r>
-          </a:p>
-          <a:p>
-            <a:endParaRPr lang="en-US" dirty="0" smtClean="0"/>
-          </a:p>
-          <a:p>
-            <a:r>
-              <a:rPr lang="en-US" dirty="0" smtClean="0"/>
-              <a:t>Server Delegate Owner Transaction Design Pattern</a:t>
-            </a:r>
-          </a:p>
-          <a:p>
-            <a:pPr lvl="1"/>
-            <a:r>
-              <a:rPr lang="en-US" dirty="0" smtClean="0"/>
-              <a:t>Apply to Command Pattern and Server Delegate Design Pattern</a:t>
-            </a:r>
-            <a:endParaRPr lang="en-US" dirty="0"/>
-          </a:p>
-        </p:txBody>
-      </p:sp>
-      <p:sp>
-        <p:nvSpPr>
-          <p:cNvPr id="4" name="Slide Number Placeholder 3"/>
-          <p:cNvSpPr>
-            <a:spLocks noGrp="1"/>
-          </p:cNvSpPr>
-          <p:nvPr>
-            <p:ph type="sldNum" sz="quarter" idx="10"/>
-          </p:nvPr>
-        </p:nvSpPr>
-        <p:spPr/>
-        <p:txBody>
-          <a:bodyPr/>
-          <a:lstStyle/>
-          <a:p>
-            <a:pPr>
-              <a:defRPr/>
-            </a:pPr>
-            <a:fld id="{924122BF-7BF8-427C-B7B6-4209414200B1}" type="slidenum">
-              <a:rPr lang="en-US" smtClean="0"/>
-              <a:pPr>
-                <a:defRPr/>
-              </a:pPr>
-              <a:t>17</a:t>
-            </a:fld>
-            <a:endParaRPr lang="en-US"/>
-          </a:p>
-        </p:txBody>
-      </p:sp>
-      <p:sp>
-        <p:nvSpPr>
-          <p:cNvPr id="5" name="Footer Placeholder 4"/>
-          <p:cNvSpPr>
-            <a:spLocks noGrp="1"/>
-          </p:cNvSpPr>
-          <p:nvPr>
-            <p:ph type="ftr" sz="quarter" idx="11"/>
-          </p:nvPr>
-        </p:nvSpPr>
-        <p:spPr/>
-        <p:txBody>
-          <a:bodyPr/>
-          <a:lstStyle/>
-          <a:p>
-            <a:pPr>
-              <a:defRPr/>
-            </a:pPr>
-            <a:r>
-              <a:rPr lang="en-US" smtClean="0"/>
-              <a:t>Gemalto Private</a:t>
-            </a:r>
-            <a:endParaRPr lang="en-US"/>
-          </a:p>
-        </p:txBody>
-      </p:sp>
-    </p:spTree>
-    <p:extLst>
-      <p:ext uri="{BB962C8B-B14F-4D97-AF65-F5344CB8AC3E}">
-        <p14:creationId xmlns:p14="http://schemas.microsoft.com/office/powerpoint/2010/main" val="1089377510"/>
-      </p:ext>
-    </p:extLst>
-  </p:cSld>
-  <p:clrMapOvr>
-    <a:masterClrMapping/>
-  </p:clrMapOvr>
+  <p:timing>
+    <p:tnLst>
+      <p:par>
+        <p:cTn id="1" dur="indefinite" restart="never" nodeType="tmRoot"/>
+      </p:par>
+    </p:tnLst>
+  </p:timing>
 </p:sld>
 </file>
 
@@ -7367,10 +7527,33 @@
             <p:ph type="title"/>
           </p:nvPr>
         </p:nvSpPr>
+        <p:spPr/>
+        <p:txBody>
+          <a:bodyPr/>
+          <a:lstStyle/>
+          <a:p>
+            <a:r>
+              <a:rPr lang="en-US" dirty="0" smtClean="0"/>
+              <a:t>Transaction Design Patterns</a:t>
+            </a:r>
+            <a:endParaRPr lang="en-US" dirty="0"/>
+          </a:p>
+        </p:txBody>
+      </p:sp>
+      <p:sp>
+        <p:nvSpPr>
+          <p:cNvPr id="3" name="Content Placeholder 2"/>
+          <p:cNvSpPr>
+            <a:spLocks noGrp="1"/>
+          </p:cNvSpPr>
+          <p:nvPr>
+            <p:ph idx="1"/>
+          </p:nvPr>
+        </p:nvSpPr>
         <p:spPr>
           <a:xfrm>
-            <a:off x="538163" y="401638"/>
-            <a:ext cx="8043862" cy="550862"/>
+            <a:off x="790574" y="1446213"/>
+            <a:ext cx="8245921" cy="4646612"/>
           </a:xfrm>
         </p:spPr>
         <p:txBody>
@@ -7378,12 +7561,62 @@
           <a:lstStyle/>
           <a:p>
             <a:r>
+              <a:rPr lang="en-US" dirty="0" smtClean="0"/>
+              <a:t>Client Owner Transaction Design Pattern</a:t>
+            </a:r>
+          </a:p>
+          <a:p>
+            <a:pPr lvl="1"/>
+            <a:r>
+              <a:rPr lang="en-US" dirty="0" smtClean="0"/>
+              <a:t>Case: require to manage transactions in presentation layer (</a:t>
+            </a:r>
+            <a:r>
               <a:rPr lang="en-US" dirty="0"/>
-              <a:t>Client Owner Transaction Design </a:t>
-            </a:r>
-            <a:r>
-              <a:rPr lang="en-US" dirty="0" smtClean="0"/>
-              <a:t>Pattern</a:t>
+              <a:t>remote </a:t>
+            </a:r>
+            <a:r>
+              <a:rPr lang="en-US" dirty="0" smtClean="0"/>
+              <a:t>access)</a:t>
+            </a:r>
+          </a:p>
+          <a:p>
+            <a:pPr lvl="1"/>
+            <a:r>
+              <a:rPr lang="en-US" dirty="0" smtClean="0"/>
+              <a:t>Case: non-remote applications that contain local fine-grained service objects</a:t>
+            </a:r>
+          </a:p>
+          <a:p>
+            <a:endParaRPr lang="en-US" dirty="0" smtClean="0"/>
+          </a:p>
+          <a:p>
+            <a:r>
+              <a:rPr lang="en-US" dirty="0" smtClean="0"/>
+              <a:t>Domain Service Owner Transaction Design Pattern</a:t>
+            </a:r>
+          </a:p>
+          <a:p>
+            <a:pPr lvl="1"/>
+            <a:r>
+              <a:rPr lang="en-US" dirty="0" smtClean="0"/>
+              <a:t>Relies on the Declarative Transaction Model</a:t>
+            </a:r>
+          </a:p>
+          <a:p>
+            <a:endParaRPr lang="en-US" dirty="0" smtClean="0"/>
+          </a:p>
+          <a:p>
+            <a:r>
+              <a:rPr lang="en-US" dirty="0" smtClean="0"/>
+              <a:t>Server Delegate Owner Transaction Design Pattern</a:t>
+            </a:r>
+          </a:p>
+          <a:p>
+            <a:pPr lvl="1"/>
+            <a:r>
+              <a:rPr lang="en-US" dirty="0" smtClean="0"/>
+              <a:t>Apply to Command Pattern and Server Delegate Design Pattern</a:t>
             </a:r>
             <a:endParaRPr lang="en-US" dirty="0"/>
           </a:p>
@@ -7413,6 +7646,130 @@
                 <a:defRPr/>
               </a:pPr>
               <a:t>18</a:t>
+            </a:fld>
+            <a:endParaRPr lang="en-US"/>
+          </a:p>
+        </p:txBody>
+      </p:sp>
+      <p:sp>
+        <p:nvSpPr>
+          <p:cNvPr id="5" name="Footer Placeholder 4"/>
+          <p:cNvSpPr>
+            <a:spLocks noGrp="1"/>
+          </p:cNvSpPr>
+          <p:nvPr>
+            <p:ph type="ftr" sz="quarter" idx="11"/>
+          </p:nvPr>
+        </p:nvSpPr>
+        <p:spPr/>
+        <p:txBody>
+          <a:bodyPr/>
+          <a:lstStyle/>
+          <a:p>
+            <a:pPr>
+              <a:defRPr/>
+            </a:pPr>
+            <a:r>
+              <a:rPr lang="en-US" smtClean="0"/>
+              <a:t>Gemalto Private</a:t>
+            </a:r>
+            <a:endParaRPr lang="en-US"/>
+          </a:p>
+        </p:txBody>
+      </p:sp>
+    </p:spTree>
+    <p:extLst>
+      <p:ext uri="{BB962C8B-B14F-4D97-AF65-F5344CB8AC3E}">
+        <p14:creationId xmlns:p14="http://schemas.microsoft.com/office/powerpoint/2010/main" val="1089377510"/>
+      </p:ext>
+    </p:extLst>
+  </p:cSld>
+  <p:clrMapOvr>
+    <a:masterClrMapping/>
+  </p:clrMapOvr>
+  <p:timing>
+    <p:tnLst>
+      <p:par>
+        <p:cTn id="1" dur="indefinite" restart="never" nodeType="tmRoot"/>
+      </p:par>
+    </p:tnLst>
+  </p:timing>
+</p:sld>
+</file>
+
+<file path=ppt/slides/slide19.xml><?xml version="1.0" encoding="utf-8"?>
+<p:sld xmlns:a="http://schemas.openxmlformats.org/drawingml/2006/main" xmlns:r="http://schemas.openxmlformats.org/officeDocument/2006/relationships" xmlns:p="http://schemas.openxmlformats.org/presentationml/2006/main">
+  <p:cSld>
+    <p:spTree>
+      <p:nvGrpSpPr>
+        <p:cNvPr id="1" name=""/>
+        <p:cNvGrpSpPr/>
+        <p:nvPr/>
+      </p:nvGrpSpPr>
+      <p:grpSpPr>
+        <a:xfrm>
+          <a:off x="0" y="0"/>
+          <a:ext cx="0" cy="0"/>
+          <a:chOff x="0" y="0"/>
+          <a:chExt cx="0" cy="0"/>
+        </a:xfrm>
+      </p:grpSpPr>
+      <p:sp>
+        <p:nvSpPr>
+          <p:cNvPr id="2" name="Title 1"/>
+          <p:cNvSpPr>
+            <a:spLocks noGrp="1"/>
+          </p:cNvSpPr>
+          <p:nvPr>
+            <p:ph type="title"/>
+          </p:nvPr>
+        </p:nvSpPr>
+        <p:spPr>
+          <a:xfrm>
+            <a:off x="538163" y="401638"/>
+            <a:ext cx="8043862" cy="550862"/>
+          </a:xfrm>
+        </p:spPr>
+        <p:txBody>
+          <a:bodyPr/>
+          <a:lstStyle/>
+          <a:p>
+            <a:r>
+              <a:rPr lang="en-US" dirty="0"/>
+              <a:t>Client Owner Transaction Design </a:t>
+            </a:r>
+            <a:r>
+              <a:rPr lang="en-US" dirty="0" smtClean="0"/>
+              <a:t>Pattern</a:t>
+            </a:r>
+            <a:endParaRPr lang="en-US" dirty="0"/>
+          </a:p>
+        </p:txBody>
+      </p:sp>
+      <p:sp>
+        <p:nvSpPr>
+          <p:cNvPr id="4" name="Slide Number Placeholder 3"/>
+          <p:cNvSpPr>
+            <a:spLocks noGrp="1"/>
+          </p:cNvSpPr>
+          <p:nvPr>
+            <p:ph type="sldNum" sz="quarter" idx="10"/>
+          </p:nvPr>
+        </p:nvSpPr>
+        <p:spPr/>
+        <p:txBody>
+          <a:bodyPr/>
+          <a:lstStyle/>
+          <a:p>
+            <a:pPr>
+              <a:defRPr/>
+            </a:pPr>
+            <a:fld id="{924122BF-7BF8-427C-B7B6-4209414200B1}" type="slidenum">
+              <a:rPr lang="en-US" smtClean="0"/>
+              <a:pPr>
+                <a:defRPr/>
+              </a:pPr>
+              <a:t>19</a:t>
             </a:fld>
             <a:endParaRPr lang="en-US"/>
           </a:p>
@@ -7645,10 +8002,198 @@
   <p:clrMapOvr>
     <a:masterClrMapping/>
   </p:clrMapOvr>
+  <p:timing>
+    <p:tnLst>
+      <p:par>
+        <p:cTn id="1" dur="indefinite" restart="never" nodeType="tmRoot"/>
+      </p:par>
+    </p:tnLst>
+  </p:timing>
 </p:sld>
 </file>
 
-<file path=ppt/slides/slide19.xml><?xml version="1.0" encoding="utf-8"?>
+<file path=ppt/slides/slide2.xml><?xml version="1.0" encoding="utf-8"?>
+<p:sld xmlns:a="http://schemas.openxmlformats.org/drawingml/2006/main" xmlns:r="http://schemas.openxmlformats.org/officeDocument/2006/relationships" xmlns:p="http://schemas.openxmlformats.org/presentationml/2006/main">
+  <p:cSld>
+    <p:spTree>
+      <p:nvGrpSpPr>
+        <p:cNvPr id="1" name=""/>
+        <p:cNvGrpSpPr/>
+        <p:nvPr/>
+      </p:nvGrpSpPr>
+      <p:grpSpPr>
+        <a:xfrm>
+          <a:off x="0" y="0"/>
+          <a:ext cx="0" cy="0"/>
+          <a:chOff x="0" y="0"/>
+          <a:chExt cx="0" cy="0"/>
+        </a:xfrm>
+      </p:grpSpPr>
+      <p:sp>
+        <p:nvSpPr>
+          <p:cNvPr id="2" name="Title 1"/>
+          <p:cNvSpPr>
+            <a:spLocks noGrp="1"/>
+          </p:cNvSpPr>
+          <p:nvPr>
+            <p:ph type="title"/>
+          </p:nvPr>
+        </p:nvSpPr>
+        <p:spPr/>
+        <p:txBody>
+          <a:bodyPr/>
+          <a:lstStyle/>
+          <a:p>
+            <a:r>
+              <a:rPr lang="en-US" dirty="0"/>
+              <a:t>3 Transaction Models</a:t>
+            </a:r>
+          </a:p>
+        </p:txBody>
+      </p:sp>
+      <p:sp>
+        <p:nvSpPr>
+          <p:cNvPr id="3" name="Content Placeholder 2"/>
+          <p:cNvSpPr>
+            <a:spLocks noGrp="1"/>
+          </p:cNvSpPr>
+          <p:nvPr>
+            <p:ph idx="1"/>
+          </p:nvPr>
+        </p:nvSpPr>
+        <p:spPr>
+          <a:xfrm>
+            <a:off x="790574" y="1446213"/>
+            <a:ext cx="8173913" cy="4646612"/>
+          </a:xfrm>
+        </p:spPr>
+        <p:txBody>
+          <a:bodyPr/>
+          <a:lstStyle/>
+          <a:p>
+            <a:r>
+              <a:rPr lang="en-US" dirty="0" smtClean="0"/>
+              <a:t>Local Transaction Model</a:t>
+            </a:r>
+          </a:p>
+          <a:p>
+            <a:pPr lvl="1"/>
+            <a:r>
+              <a:rPr lang="en-US" dirty="0" smtClean="0"/>
+              <a:t>Manage connections</a:t>
+            </a:r>
+          </a:p>
+          <a:p>
+            <a:pPr lvl="1"/>
+            <a:endParaRPr lang="en-US" dirty="0"/>
+          </a:p>
+          <a:p>
+            <a:r>
+              <a:rPr lang="en-US" dirty="0" smtClean="0"/>
+              <a:t>Programmatic Transaction </a:t>
+            </a:r>
+            <a:r>
+              <a:rPr lang="en-US" dirty="0" smtClean="0"/>
+              <a:t>Model</a:t>
+            </a:r>
+          </a:p>
+          <a:p>
+            <a:pPr lvl="1"/>
+            <a:r>
+              <a:rPr lang="en-US" dirty="0" smtClean="0"/>
+              <a:t>Manage transactions</a:t>
+            </a:r>
+            <a:endParaRPr lang="en-US" dirty="0" smtClean="0"/>
+          </a:p>
+          <a:p>
+            <a:pPr lvl="1"/>
+            <a:endParaRPr lang="en-US" dirty="0" smtClean="0"/>
+          </a:p>
+          <a:p>
+            <a:r>
+              <a:rPr lang="en-US" dirty="0" smtClean="0"/>
+              <a:t>Declarative Transaction Model</a:t>
+            </a:r>
+            <a:endParaRPr lang="en-US" dirty="0"/>
+          </a:p>
+        </p:txBody>
+      </p:sp>
+      <p:sp>
+        <p:nvSpPr>
+          <p:cNvPr id="4" name="Slide Number Placeholder 3"/>
+          <p:cNvSpPr>
+            <a:spLocks noGrp="1"/>
+          </p:cNvSpPr>
+          <p:nvPr>
+            <p:ph type="sldNum" sz="quarter" idx="10"/>
+          </p:nvPr>
+        </p:nvSpPr>
+        <p:spPr/>
+        <p:txBody>
+          <a:bodyPr/>
+          <a:lstStyle/>
+          <a:p>
+            <a:pPr>
+              <a:defRPr/>
+            </a:pPr>
+            <a:fld id="{924122BF-7BF8-427C-B7B6-4209414200B1}" type="slidenum">
+              <a:rPr lang="en-US" smtClean="0"/>
+              <a:pPr>
+                <a:defRPr/>
+              </a:pPr>
+              <a:t>2</a:t>
+            </a:fld>
+            <a:endParaRPr lang="en-US"/>
+          </a:p>
+        </p:txBody>
+      </p:sp>
+      <p:sp>
+        <p:nvSpPr>
+          <p:cNvPr id="5" name="Footer Placeholder 4"/>
+          <p:cNvSpPr>
+            <a:spLocks noGrp="1"/>
+          </p:cNvSpPr>
+          <p:nvPr>
+            <p:ph type="ftr" sz="quarter" idx="11"/>
+          </p:nvPr>
+        </p:nvSpPr>
+        <p:spPr/>
+        <p:txBody>
+          <a:bodyPr/>
+          <a:lstStyle/>
+          <a:p>
+            <a:pPr>
+              <a:defRPr/>
+            </a:pPr>
+            <a:r>
+              <a:rPr lang="en-US" smtClean="0"/>
+              <a:t>Gemalto Private</a:t>
+            </a:r>
+            <a:endParaRPr lang="en-US"/>
+          </a:p>
+        </p:txBody>
+      </p:sp>
+    </p:spTree>
+    <p:extLst>
+      <p:ext uri="{BB962C8B-B14F-4D97-AF65-F5344CB8AC3E}">
+        <p14:creationId xmlns:p14="http://schemas.microsoft.com/office/powerpoint/2010/main" val="446474917"/>
+      </p:ext>
+    </p:extLst>
+  </p:cSld>
+  <p:clrMapOvr>
+    <a:masterClrMapping/>
+  </p:clrMapOvr>
+  <p:timing>
+    <p:tnLst>
+      <p:par>
+        <p:cTn id="1" dur="indefinite" restart="never" nodeType="tmRoot"/>
+      </p:par>
+    </p:tnLst>
+  </p:timing>
+</p:sld>
+</file>
+
+<file path=ppt/slides/slide20.xml><?xml version="1.0" encoding="utf-8"?>
 <p:sld xmlns:a="http://schemas.openxmlformats.org/drawingml/2006/main" xmlns:r="http://schemas.openxmlformats.org/officeDocument/2006/relationships" xmlns:p="http://schemas.openxmlformats.org/presentationml/2006/main">
   <p:cSld>
     <p:spTree>
@@ -7823,7 +8368,7 @@
               <a:pPr>
                 <a:defRPr/>
               </a:pPr>
-              <a:t>19</a:t>
+              <a:t>20</a:t>
             </a:fld>
             <a:endParaRPr lang="en-US"/>
           </a:p>
@@ -7865,172 +8410,17 @@
   <p:clrMapOvr>
     <a:masterClrMapping/>
   </p:clrMapOvr>
+  <p:timing>
+    <p:tnLst>
+      <p:par>
+        <p:cTn id="1" dur="indefinite" restart="never" nodeType="tmRoot"/>
+      </p:par>
+    </p:tnLst>
+  </p:timing>
 </p:sld>
 </file>
 
-<file path=ppt/slides/slide2.xml><?xml version="1.0" encoding="utf-8"?>
-<p:sld xmlns:a="http://schemas.openxmlformats.org/drawingml/2006/main" xmlns:r="http://schemas.openxmlformats.org/officeDocument/2006/relationships" xmlns:p="http://schemas.openxmlformats.org/presentationml/2006/main">
-  <p:cSld>
-    <p:spTree>
-      <p:nvGrpSpPr>
-        <p:cNvPr id="1" name=""/>
-        <p:cNvGrpSpPr/>
-        <p:nvPr/>
-      </p:nvGrpSpPr>
-      <p:grpSpPr>
-        <a:xfrm>
-          <a:off x="0" y="0"/>
-          <a:ext cx="0" cy="0"/>
-          <a:chOff x="0" y="0"/>
-          <a:chExt cx="0" cy="0"/>
-        </a:xfrm>
-      </p:grpSpPr>
-      <p:sp>
-        <p:nvSpPr>
-          <p:cNvPr id="2" name="Title 1"/>
-          <p:cNvSpPr>
-            <a:spLocks noGrp="1"/>
-          </p:cNvSpPr>
-          <p:nvPr>
-            <p:ph type="title"/>
-          </p:nvPr>
-        </p:nvSpPr>
-        <p:spPr/>
-        <p:txBody>
-          <a:bodyPr/>
-          <a:lstStyle/>
-          <a:p>
-            <a:r>
-              <a:rPr lang="en-US" dirty="0"/>
-              <a:t>3 Transaction Models</a:t>
-            </a:r>
-          </a:p>
-        </p:txBody>
-      </p:sp>
-      <p:sp>
-        <p:nvSpPr>
-          <p:cNvPr id="3" name="Content Placeholder 2"/>
-          <p:cNvSpPr>
-            <a:spLocks noGrp="1"/>
-          </p:cNvSpPr>
-          <p:nvPr>
-            <p:ph idx="1"/>
-          </p:nvPr>
-        </p:nvSpPr>
-        <p:spPr>
-          <a:xfrm>
-            <a:off x="790574" y="1446213"/>
-            <a:ext cx="8173913" cy="4646612"/>
-          </a:xfrm>
-        </p:spPr>
-        <p:txBody>
-          <a:bodyPr/>
-          <a:lstStyle/>
-          <a:p>
-            <a:r>
-              <a:rPr lang="en-US" dirty="0" smtClean="0"/>
-              <a:t>Local Transaction Model</a:t>
-            </a:r>
-          </a:p>
-          <a:p>
-            <a:pPr lvl="1"/>
-            <a:r>
-              <a:rPr lang="en-US" dirty="0" smtClean="0"/>
-              <a:t>Manage connections</a:t>
-            </a:r>
-          </a:p>
-          <a:p>
-            <a:pPr lvl="1"/>
-            <a:endParaRPr lang="en-US" dirty="0"/>
-          </a:p>
-          <a:p>
-            <a:r>
-              <a:rPr lang="en-US" dirty="0" smtClean="0"/>
-              <a:t>Programmatic Transaction Model</a:t>
-            </a:r>
-          </a:p>
-          <a:p>
-            <a:pPr lvl="1"/>
-            <a:endParaRPr lang="en-US" dirty="0" smtClean="0"/>
-          </a:p>
-          <a:p>
-            <a:r>
-              <a:rPr lang="en-US" dirty="0" smtClean="0"/>
-              <a:t>Declarative Transaction Model</a:t>
-            </a:r>
-            <a:endParaRPr lang="en-US" dirty="0"/>
-          </a:p>
-        </p:txBody>
-      </p:sp>
-      <p:sp>
-        <p:nvSpPr>
-          <p:cNvPr id="4" name="Slide Number Placeholder 3"/>
-          <p:cNvSpPr>
-            <a:spLocks noGrp="1"/>
-          </p:cNvSpPr>
-          <p:nvPr>
-            <p:ph type="sldNum" sz="quarter" idx="10"/>
-          </p:nvPr>
-        </p:nvSpPr>
-        <p:spPr/>
-        <p:txBody>
-          <a:bodyPr/>
-          <a:lstStyle/>
-          <a:p>
-            <a:pPr>
-              <a:defRPr/>
-            </a:pPr>
-            <a:fld id="{924122BF-7BF8-427C-B7B6-4209414200B1}" type="slidenum">
-              <a:rPr lang="en-US" smtClean="0"/>
-              <a:pPr>
-                <a:defRPr/>
-              </a:pPr>
-              <a:t>2</a:t>
-            </a:fld>
-            <a:endParaRPr lang="en-US"/>
-          </a:p>
-        </p:txBody>
-      </p:sp>
-      <p:sp>
-        <p:nvSpPr>
-          <p:cNvPr id="5" name="Footer Placeholder 4"/>
-          <p:cNvSpPr>
-            <a:spLocks noGrp="1"/>
-          </p:cNvSpPr>
-          <p:nvPr>
-            <p:ph type="ftr" sz="quarter" idx="11"/>
-          </p:nvPr>
-        </p:nvSpPr>
-        <p:spPr/>
-        <p:txBody>
-          <a:bodyPr/>
-          <a:lstStyle/>
-          <a:p>
-            <a:pPr>
-              <a:defRPr/>
-            </a:pPr>
-            <a:r>
-              <a:rPr lang="en-US" smtClean="0"/>
-              <a:t>Gemalto Private</a:t>
-            </a:r>
-            <a:endParaRPr lang="en-US"/>
-          </a:p>
-        </p:txBody>
-      </p:sp>
-    </p:spTree>
-    <p:extLst>
-      <p:ext uri="{BB962C8B-B14F-4D97-AF65-F5344CB8AC3E}">
-        <p14:creationId xmlns:p14="http://schemas.microsoft.com/office/powerpoint/2010/main" val="446474917"/>
-      </p:ext>
-    </p:extLst>
-  </p:cSld>
-  <p:clrMapOvr>
-    <a:masterClrMapping/>
-  </p:clrMapOvr>
-</p:sld>
-</file>
-
-<file path=ppt/slides/slide20.xml><?xml version="1.0" encoding="utf-8"?>
+<file path=ppt/slides/slide21.xml><?xml version="1.0" encoding="utf-8"?>
 <p:sld xmlns:a="http://schemas.openxmlformats.org/drawingml/2006/main" xmlns:r="http://schemas.openxmlformats.org/officeDocument/2006/relationships" xmlns:p="http://schemas.openxmlformats.org/presentationml/2006/main">
   <p:cSld>
     <p:spTree>
@@ -8216,7 +8606,7 @@
               <a:pPr>
                 <a:defRPr/>
               </a:pPr>
-              <a:t>20</a:t>
+              <a:t>21</a:t>
             </a:fld>
             <a:endParaRPr lang="en-US"/>
           </a:p>
@@ -8258,10 +8648,17 @@
   <p:clrMapOvr>
     <a:masterClrMapping/>
   </p:clrMapOvr>
+  <p:timing>
+    <p:tnLst>
+      <p:par>
+        <p:cTn id="1" dur="indefinite" restart="never" nodeType="tmRoot"/>
+      </p:par>
+    </p:tnLst>
+  </p:timing>
 </p:sld>
 </file>
 
-<file path=ppt/slides/slide21.xml><?xml version="1.0" encoding="utf-8"?>
+<file path=ppt/slides/slide22.xml><?xml version="1.0" encoding="utf-8"?>
 <p:sld xmlns:a="http://schemas.openxmlformats.org/drawingml/2006/main" xmlns:r="http://schemas.openxmlformats.org/officeDocument/2006/relationships" xmlns:p="http://schemas.openxmlformats.org/presentationml/2006/main">
   <p:cSld>
     <p:spTree>
@@ -8410,7 +8807,7 @@
               <a:pPr>
                 <a:defRPr/>
               </a:pPr>
-              <a:t>21</a:t>
+              <a:t>22</a:t>
             </a:fld>
             <a:endParaRPr lang="en-US"/>
           </a:p>
@@ -8452,6 +8849,13 @@
   <p:clrMapOvr>
     <a:masterClrMapping/>
   </p:clrMapOvr>
+  <p:timing>
+    <p:tnLst>
+      <p:par>
+        <p:cTn id="1" dur="indefinite" restart="never" nodeType="tmRoot"/>
+      </p:par>
+    </p:tnLst>
+  </p:timing>
 </p:sld>
 </file>
 
@@ -8488,193 +8892,86 @@
           <a:lstStyle/>
           <a:p>
             <a:r>
+              <a:rPr lang="en-US" dirty="0" smtClean="0"/>
+              <a:t>Local Transaction Model</a:t>
+            </a:r>
+            <a:endParaRPr lang="en-US" dirty="0"/>
+          </a:p>
+        </p:txBody>
+      </p:sp>
+      <p:sp>
+        <p:nvSpPr>
+          <p:cNvPr id="3" name="Content Placeholder 2"/>
+          <p:cNvSpPr>
+            <a:spLocks noGrp="1"/>
+          </p:cNvSpPr>
+          <p:nvPr>
+            <p:ph idx="1"/>
+          </p:nvPr>
+        </p:nvSpPr>
+        <p:spPr/>
+        <p:txBody>
+          <a:bodyPr/>
+          <a:lstStyle/>
+          <a:p>
+            <a:r>
               <a:rPr lang="en-US" dirty="0"/>
-              <a:t>Programmatic Transaction Model</a:t>
-            </a:r>
-          </a:p>
-        </p:txBody>
-      </p:sp>
-      <p:sp>
-        <p:nvSpPr>
-          <p:cNvPr id="3" name="Content Placeholder 2"/>
-          <p:cNvSpPr>
-            <a:spLocks noGrp="1"/>
-          </p:cNvSpPr>
-          <p:nvPr>
-            <p:ph idx="1"/>
-          </p:nvPr>
-        </p:nvSpPr>
-        <p:spPr/>
-        <p:txBody>
-          <a:bodyPr>
-            <a:normAutofit fontScale="70000" lnSpcReduction="20000"/>
-          </a:bodyPr>
-          <a:lstStyle/>
-          <a:p>
-            <a:r>
-              <a:rPr lang="en-US" dirty="0" err="1" smtClean="0"/>
-              <a:t>Javax.transaction.UserTransaction</a:t>
-            </a:r>
-            <a:endParaRPr lang="en-US" dirty="0" smtClean="0"/>
-          </a:p>
-          <a:p>
-            <a:endParaRPr lang="en-US" dirty="0"/>
-          </a:p>
-          <a:p>
+              <a:t>Transaction management is handled </a:t>
+            </a:r>
+            <a:r>
+              <a:rPr lang="en-US" dirty="0" smtClean="0"/>
+              <a:t>by:</a:t>
+            </a:r>
+          </a:p>
+          <a:p>
+            <a:pPr lvl="1"/>
+            <a:r>
+              <a:rPr lang="en-US" dirty="0" smtClean="0"/>
+              <a:t>The </a:t>
+            </a:r>
             <a:r>
               <a:rPr lang="en-US" dirty="0"/>
-              <a:t>Manage </a:t>
-            </a:r>
-            <a:r>
-              <a:rPr lang="en-US" dirty="0" smtClean="0"/>
-              <a:t>transactions</a:t>
-            </a:r>
-          </a:p>
-          <a:p>
-            <a:endParaRPr lang="en-US" dirty="0"/>
-          </a:p>
-          <a:p>
+              <a:t>underlying Database (DBMS</a:t>
+            </a:r>
+            <a:r>
+              <a:rPr lang="en-US" dirty="0" smtClean="0"/>
+              <a:t>)</a:t>
+            </a:r>
+          </a:p>
+          <a:p>
+            <a:pPr lvl="1"/>
+            <a:r>
+              <a:rPr lang="en-US" dirty="0" smtClean="0"/>
+              <a:t>The </a:t>
+            </a:r>
             <a:r>
               <a:rPr lang="en-US" dirty="0"/>
-              <a:t>Pay close attention to exception </a:t>
-            </a:r>
-            <a:r>
-              <a:rPr lang="en-US" dirty="0" smtClean="0"/>
-              <a:t>handling</a:t>
-            </a:r>
-          </a:p>
-          <a:p>
-            <a:endParaRPr lang="en-US" dirty="0"/>
-          </a:p>
-          <a:p>
-            <a:r>
-              <a:rPr lang="en-US" dirty="0"/>
-              <a:t>Transaction Context Problem</a:t>
+              <a:t>underlying messaging </a:t>
+            </a:r>
+            <a:r>
+              <a:rPr lang="en-US" dirty="0" smtClean="0"/>
+              <a:t>provider (For JMS)</a:t>
+            </a:r>
+          </a:p>
+          <a:p>
+            <a:r>
+              <a:rPr lang="en-US" dirty="0" smtClean="0"/>
+              <a:t>Limitation</a:t>
             </a:r>
           </a:p>
           <a:p>
             <a:pPr lvl="1"/>
             <a:r>
-              <a:rPr lang="en-US" dirty="0"/>
-              <a:t>Pass a transaction context from one bean using programmatic transactions into another bean using programmatic </a:t>
-            </a:r>
-            <a:r>
-              <a:rPr lang="en-US" dirty="0" smtClean="0"/>
-              <a:t>transitions</a:t>
+              <a:rPr lang="en-US" dirty="0" smtClean="0"/>
+              <a:t>Easy to be wrong</a:t>
             </a:r>
           </a:p>
           <a:p>
             <a:pPr lvl="1"/>
-            <a:endParaRPr lang="en-US" dirty="0"/>
-          </a:p>
-          <a:p>
-            <a:r>
-              <a:rPr lang="en-US" dirty="0"/>
-              <a:t>Use Case: Client-initiated transactions</a:t>
-            </a:r>
-          </a:p>
-          <a:p>
-            <a:pPr lvl="1"/>
-            <a:r>
-              <a:rPr lang="en-US" dirty="0"/>
-              <a:t>The client makes multiple remote calls for a single business request</a:t>
-            </a:r>
-          </a:p>
-          <a:p>
-            <a:pPr lvl="1"/>
-            <a:r>
-              <a:rPr lang="en-US" dirty="0"/>
-              <a:t>Programmatic transactions on client; declarative transactions on remote </a:t>
-            </a:r>
-            <a:r>
-              <a:rPr lang="en-US" dirty="0" smtClean="0"/>
-              <a:t>EJBs</a:t>
-            </a:r>
-          </a:p>
-          <a:p>
-            <a:pPr lvl="1"/>
-            <a:endParaRPr lang="en-US" dirty="0"/>
-          </a:p>
-          <a:p>
-            <a:r>
-              <a:rPr lang="en-US" dirty="0"/>
-              <a:t>Use Case: Localized JTA </a:t>
-            </a:r>
-            <a:r>
-              <a:rPr lang="en-US" dirty="0" smtClean="0"/>
-              <a:t>transactions</a:t>
-            </a:r>
-          </a:p>
-          <a:p>
-            <a:pPr lvl="1"/>
-            <a:r>
-              <a:rPr lang="en-US" dirty="0" smtClean="0"/>
-              <a:t>For performance reason</a:t>
-            </a:r>
-          </a:p>
-          <a:p>
-            <a:pPr lvl="1"/>
-            <a:r>
-              <a:rPr lang="en-US" dirty="0" smtClean="0"/>
-              <a:t>Difficult to do with declarative transactions due to the lack of control of when the transaction start or terminate</a:t>
-            </a:r>
-          </a:p>
-          <a:p>
-            <a:pPr lvl="1"/>
-            <a:endParaRPr lang="en-US" dirty="0" smtClean="0"/>
-          </a:p>
-          <a:p>
-            <a:r>
-              <a:rPr lang="en-US" dirty="0" smtClean="0"/>
-              <a:t>Long-running JTA Transactions</a:t>
-            </a:r>
-          </a:p>
-          <a:p>
-            <a:pPr lvl="1"/>
-            <a:r>
-              <a:rPr lang="en-US" dirty="0" smtClean="0"/>
-              <a:t>Start a transaction in one </a:t>
-            </a:r>
-            <a:r>
-              <a:rPr lang="en-US" dirty="0" err="1" smtClean="0"/>
-              <a:t>Stateful</a:t>
-            </a:r>
-            <a:r>
-              <a:rPr lang="en-US" dirty="0" smtClean="0"/>
-              <a:t> </a:t>
-            </a:r>
-            <a:r>
-              <a:rPr lang="en-US" dirty="0" err="1" smtClean="0"/>
-              <a:t>SessionBean</a:t>
-            </a:r>
-            <a:r>
-              <a:rPr lang="en-US" dirty="0" smtClean="0"/>
-              <a:t> method and terminate it in a different </a:t>
-            </a:r>
-            <a:r>
-              <a:rPr lang="en-US" dirty="0" err="1" smtClean="0"/>
-              <a:t>Stateful</a:t>
-            </a:r>
-            <a:r>
-              <a:rPr lang="en-US" dirty="0" smtClean="0"/>
-              <a:t> </a:t>
-            </a:r>
-            <a:r>
-              <a:rPr lang="en-US" dirty="0" err="1" smtClean="0"/>
-              <a:t>SessionBean</a:t>
-            </a:r>
-            <a:r>
-              <a:rPr lang="en-US" dirty="0" smtClean="0"/>
-              <a:t> method</a:t>
-            </a:r>
-          </a:p>
-          <a:p>
-            <a:pPr lvl="1"/>
-            <a:r>
-              <a:rPr lang="en-US" dirty="0" smtClean="0"/>
-              <a:t>Poor Design</a:t>
-            </a:r>
-            <a:endParaRPr lang="en-US" dirty="0"/>
+            <a:r>
+              <a:rPr lang="en-US" dirty="0" smtClean="0"/>
+              <a:t>Cannot support XA</a:t>
+            </a:r>
           </a:p>
           <a:p>
             <a:endParaRPr lang="en-US" dirty="0"/>
@@ -8736,16 +9033,47 @@
           </a:p>
         </p:txBody>
       </p:sp>
+      <p:pic>
+        <p:nvPicPr>
+          <p:cNvPr id="7" name="Picture 6"/>
+          <p:cNvPicPr>
+            <a:picLocks noChangeAspect="1"/>
+          </p:cNvPicPr>
+          <p:nvPr/>
+        </p:nvPicPr>
+        <p:blipFill>
+          <a:blip r:embed="rId2"/>
+          <a:stretch>
+            <a:fillRect/>
+          </a:stretch>
+        </p:blipFill>
+        <p:spPr>
+          <a:xfrm>
+            <a:off x="3635896" y="2683809"/>
+            <a:ext cx="5090145" cy="3394995"/>
+          </a:xfrm>
+          <a:prstGeom prst="rect">
+            <a:avLst/>
+          </a:prstGeom>
+        </p:spPr>
+      </p:pic>
     </p:spTree>
     <p:extLst>
       <p:ext uri="{BB962C8B-B14F-4D97-AF65-F5344CB8AC3E}">
-        <p14:creationId xmlns:p14="http://schemas.microsoft.com/office/powerpoint/2010/main" val="1251644678"/>
+        <p14:creationId xmlns:p14="http://schemas.microsoft.com/office/powerpoint/2010/main" val="1350454866"/>
       </p:ext>
     </p:extLst>
   </p:cSld>
   <p:clrMapOvr>
     <a:masterClrMapping/>
   </p:clrMapOvr>
+  <p:timing>
+    <p:tnLst>
+      <p:par>
+        <p:cTn id="1" dur="indefinite" restart="never" nodeType="tmRoot"/>
+      </p:par>
+    </p:tnLst>
+  </p:timing>
 </p:sld>
 </file>
 
@@ -8782,316 +9110,196 @@
           <a:lstStyle/>
           <a:p>
             <a:r>
-              <a:rPr lang="en-US" dirty="0" smtClean="0"/>
-              <a:t>Require traction control outside of the container</a:t>
-            </a:r>
+              <a:rPr lang="en-US" dirty="0"/>
+              <a:t>Programmatic Transaction Model</a:t>
+            </a:r>
+          </a:p>
+        </p:txBody>
+      </p:sp>
+      <p:sp>
+        <p:nvSpPr>
+          <p:cNvPr id="3" name="Content Placeholder 2"/>
+          <p:cNvSpPr>
+            <a:spLocks noGrp="1"/>
+          </p:cNvSpPr>
+          <p:nvPr>
+            <p:ph idx="1"/>
+          </p:nvPr>
+        </p:nvSpPr>
+        <p:spPr/>
+        <p:txBody>
+          <a:bodyPr>
+            <a:normAutofit fontScale="70000" lnSpcReduction="20000"/>
+          </a:bodyPr>
+          <a:lstStyle/>
+          <a:p>
+            <a:r>
+              <a:rPr lang="en-US" dirty="0" err="1" smtClean="0"/>
+              <a:t>Javax.transaction.UserTransaction</a:t>
+            </a:r>
+            <a:endParaRPr lang="en-US" dirty="0" smtClean="0"/>
+          </a:p>
+          <a:p>
             <a:endParaRPr lang="en-US" dirty="0"/>
           </a:p>
-        </p:txBody>
-      </p:sp>
-      <p:sp>
-        <p:nvSpPr>
-          <p:cNvPr id="3" name="Content Placeholder 2"/>
-          <p:cNvSpPr>
-            <a:spLocks noGrp="1"/>
-          </p:cNvSpPr>
-          <p:nvPr>
-            <p:ph idx="1"/>
-          </p:nvPr>
-        </p:nvSpPr>
-        <p:spPr/>
-        <p:txBody>
-          <a:bodyPr/>
-          <a:lstStyle/>
-          <a:p>
-            <a:r>
-              <a:rPr lang="en-US" dirty="0" smtClean="0"/>
-              <a:t>Load the application-server specific </a:t>
-            </a:r>
-            <a:r>
-              <a:rPr lang="en-US" i="1" dirty="0" err="1" smtClean="0"/>
-              <a:t>TransactionManagerFactory</a:t>
-            </a:r>
-            <a:r>
-              <a:rPr lang="en-US" dirty="0" smtClean="0"/>
-              <a:t> class</a:t>
-            </a:r>
-          </a:p>
-          <a:p>
-            <a:pPr marL="457200" lvl="1" indent="0">
-              <a:buNone/>
-            </a:pPr>
-            <a:r>
-              <a:rPr lang="en-US" dirty="0" smtClean="0">
-                <a:solidFill>
-                  <a:schemeClr val="tx2">
-                    <a:lumMod val="60000"/>
-                    <a:lumOff val="40000"/>
-                  </a:schemeClr>
-                </a:solidFill>
-              </a:rPr>
-              <a:t>Class </a:t>
-            </a:r>
-            <a:r>
-              <a:rPr lang="en-US" dirty="0" err="1" smtClean="0">
-                <a:solidFill>
-                  <a:schemeClr val="tx2">
-                    <a:lumMod val="60000"/>
-                    <a:lumOff val="40000"/>
-                  </a:schemeClr>
-                </a:solidFill>
-              </a:rPr>
-              <a:t>txnClass</a:t>
-            </a:r>
-            <a:r>
-              <a:rPr lang="en-US" dirty="0" smtClean="0">
-                <a:solidFill>
-                  <a:schemeClr val="tx2">
-                    <a:lumMod val="60000"/>
-                    <a:lumOff val="40000"/>
-                  </a:schemeClr>
-                </a:solidFill>
-              </a:rPr>
-              <a:t> =</a:t>
-            </a:r>
-          </a:p>
-          <a:p>
-            <a:pPr marL="457200" lvl="1" indent="0">
-              <a:buNone/>
-            </a:pPr>
-            <a:r>
-              <a:rPr lang="en-US" dirty="0">
-                <a:solidFill>
-                  <a:schemeClr val="tx2">
-                    <a:lumMod val="60000"/>
-                    <a:lumOff val="40000"/>
-                  </a:schemeClr>
-                </a:solidFill>
-              </a:rPr>
-              <a:t>	</a:t>
-            </a:r>
-            <a:r>
-              <a:rPr lang="en-US" dirty="0" err="1" smtClean="0">
-                <a:solidFill>
-                  <a:schemeClr val="tx2">
-                    <a:lumMod val="60000"/>
-                    <a:lumOff val="40000"/>
-                  </a:schemeClr>
-                </a:solidFill>
-              </a:rPr>
-              <a:t>Class.forName</a:t>
-            </a:r>
-            <a:r>
-              <a:rPr lang="en-US" dirty="0" smtClean="0">
-                <a:solidFill>
-                  <a:schemeClr val="tx2">
-                    <a:lumMod val="60000"/>
-                    <a:lumOff val="40000"/>
-                  </a:schemeClr>
-                </a:solidFill>
-              </a:rPr>
-              <a:t>(“</a:t>
-            </a:r>
-            <a:r>
-              <a:rPr lang="en-US" i="1" dirty="0" err="1" smtClean="0">
-                <a:solidFill>
-                  <a:schemeClr val="accent1">
-                    <a:lumMod val="60000"/>
-                    <a:lumOff val="40000"/>
-                  </a:schemeClr>
-                </a:solidFill>
-              </a:rPr>
-              <a:t>com.ibm.ejs.jts.jta.TransactionManageFactory</a:t>
-            </a:r>
-            <a:r>
-              <a:rPr lang="en-US" dirty="0" smtClean="0">
-                <a:solidFill>
-                  <a:schemeClr val="tx2">
-                    <a:lumMod val="60000"/>
-                    <a:lumOff val="40000"/>
-                  </a:schemeClr>
-                </a:solidFill>
-              </a:rPr>
-              <a:t>”)</a:t>
-            </a:r>
-          </a:p>
-          <a:p>
-            <a:pPr marL="457200" lvl="1" indent="0">
-              <a:buNone/>
-            </a:pPr>
+          <a:p>
+            <a:r>
+              <a:rPr lang="en-US" dirty="0"/>
+              <a:t>Manage </a:t>
+            </a:r>
+            <a:r>
+              <a:rPr lang="en-US" dirty="0" smtClean="0"/>
+              <a:t>transactions</a:t>
+            </a:r>
+          </a:p>
+          <a:p>
             <a:endParaRPr lang="en-US" dirty="0"/>
           </a:p>
           <a:p>
             <a:r>
-              <a:rPr lang="en-US" dirty="0" smtClean="0"/>
-              <a:t>Get </a:t>
-            </a:r>
-            <a:r>
-              <a:rPr lang="en-US" i="1" dirty="0" err="1" smtClean="0"/>
-              <a:t>TransactionManager</a:t>
-            </a:r>
-            <a:r>
-              <a:rPr lang="en-US" dirty="0" smtClean="0"/>
-              <a:t> by using reflection</a:t>
-            </a:r>
-          </a:p>
-          <a:p>
-            <a:pPr marL="457200" lvl="1" indent="0">
-              <a:buNone/>
-            </a:pPr>
-            <a:r>
-              <a:rPr lang="en-US" dirty="0" err="1" smtClean="0">
-                <a:solidFill>
-                  <a:schemeClr val="tx2">
-                    <a:lumMod val="60000"/>
-                    <a:lumOff val="40000"/>
-                  </a:schemeClr>
-                </a:solidFill>
-              </a:rPr>
-              <a:t>TransactionManager</a:t>
-            </a:r>
-            <a:r>
-              <a:rPr lang="en-US" dirty="0" smtClean="0">
-                <a:solidFill>
-                  <a:schemeClr val="tx2">
-                    <a:lumMod val="60000"/>
-                    <a:lumOff val="40000"/>
-                  </a:schemeClr>
-                </a:solidFill>
-              </a:rPr>
+              <a:rPr lang="en-US" dirty="0"/>
+              <a:t>Pay close attention to exception </a:t>
+            </a:r>
+            <a:r>
+              <a:rPr lang="en-US" dirty="0" smtClean="0"/>
+              <a:t>handling</a:t>
+            </a:r>
+          </a:p>
+          <a:p>
+            <a:endParaRPr lang="en-US" dirty="0"/>
+          </a:p>
+          <a:p>
+            <a:r>
+              <a:rPr lang="en-US" dirty="0"/>
+              <a:t>Transaction Context Problem</a:t>
+            </a:r>
+          </a:p>
+          <a:p>
+            <a:pPr lvl="1"/>
+            <a:r>
+              <a:rPr lang="en-US" dirty="0"/>
+              <a:t>Pass a transaction context from one bean using programmatic transactions into another bean using programmatic </a:t>
+            </a:r>
+            <a:r>
+              <a:rPr lang="en-US" dirty="0" smtClean="0"/>
+              <a:t>transitions</a:t>
+            </a:r>
+          </a:p>
+          <a:p>
+            <a:pPr lvl="1"/>
+            <a:endParaRPr lang="en-US" dirty="0"/>
+          </a:p>
+          <a:p>
+            <a:r>
+              <a:rPr lang="en-US" dirty="0"/>
+              <a:t>Use Case: Client-initiated transactions</a:t>
+            </a:r>
+          </a:p>
+          <a:p>
+            <a:pPr lvl="1"/>
+            <a:r>
+              <a:rPr lang="en-US" dirty="0"/>
+              <a:t>The client makes multiple remote calls for a single business request</a:t>
+            </a:r>
+          </a:p>
+          <a:p>
+            <a:pPr lvl="1"/>
+            <a:r>
+              <a:rPr lang="en-US" dirty="0"/>
+              <a:t>Programmatic transactions on client; declarative transactions on remote </a:t>
+            </a:r>
+            <a:r>
+              <a:rPr lang="en-US" dirty="0" smtClean="0"/>
+              <a:t>EJBs</a:t>
+            </a:r>
+          </a:p>
+          <a:p>
+            <a:pPr lvl="1"/>
+            <a:endParaRPr lang="en-US" dirty="0"/>
+          </a:p>
+          <a:p>
+            <a:r>
+              <a:rPr lang="en-US" dirty="0"/>
+              <a:t>Use Case: Localized JTA </a:t>
+            </a:r>
+            <a:r>
+              <a:rPr lang="en-US" dirty="0" smtClean="0"/>
+              <a:t>transactions</a:t>
+            </a:r>
+          </a:p>
+          <a:p>
+            <a:pPr lvl="1"/>
+            <a:r>
+              <a:rPr lang="en-US" dirty="0" smtClean="0"/>
+              <a:t>For performance reason</a:t>
+            </a:r>
+          </a:p>
+          <a:p>
+            <a:pPr lvl="1"/>
+            <a:r>
+              <a:rPr lang="en-US" dirty="0" smtClean="0"/>
+              <a:t>Difficult to do with declarative transactions due to the lack of control of when the transaction start or terminate</a:t>
+            </a:r>
+          </a:p>
+          <a:p>
+            <a:pPr lvl="1"/>
+            <a:endParaRPr lang="en-US" dirty="0" smtClean="0"/>
+          </a:p>
+          <a:p>
+            <a:r>
+              <a:rPr lang="en-US" dirty="0" smtClean="0"/>
+              <a:t>Long-running JTA Transactions</a:t>
+            </a:r>
+          </a:p>
+          <a:p>
+            <a:pPr lvl="1"/>
+            <a:r>
+              <a:rPr lang="en-US" dirty="0" smtClean="0"/>
+              <a:t>Start a transaction in one </a:t>
+            </a:r>
+            <a:r>
+              <a:rPr lang="en-US" dirty="0" err="1" smtClean="0"/>
+              <a:t>Stateful</a:t>
+            </a:r>
+            <a:r>
+              <a:rPr lang="en-US" dirty="0" smtClean="0"/>
               <a:t> </a:t>
             </a:r>
             <a:r>
-              <a:rPr lang="en-US" dirty="0" err="1" smtClean="0">
-                <a:solidFill>
-                  <a:schemeClr val="tx2">
-                    <a:lumMod val="60000"/>
-                    <a:lumOff val="40000"/>
-                  </a:schemeClr>
-                </a:solidFill>
-              </a:rPr>
-              <a:t>txnMgr</a:t>
-            </a:r>
-            <a:r>
-              <a:rPr lang="en-US" dirty="0" smtClean="0">
-                <a:solidFill>
-                  <a:schemeClr val="tx2">
-                    <a:lumMod val="60000"/>
-                    <a:lumOff val="40000"/>
-                  </a:schemeClr>
-                </a:solidFill>
-              </a:rPr>
-              <a:t> =</a:t>
-            </a:r>
-          </a:p>
-          <a:p>
-            <a:pPr marL="457200" lvl="1" indent="0">
-              <a:buNone/>
-            </a:pPr>
-            <a:r>
-              <a:rPr lang="en-US" dirty="0" smtClean="0">
-                <a:solidFill>
-                  <a:schemeClr val="tx2">
-                    <a:lumMod val="60000"/>
-                    <a:lumOff val="40000"/>
-                  </a:schemeClr>
-                </a:solidFill>
-              </a:rPr>
-              <a:t>	(</a:t>
-            </a:r>
-            <a:r>
-              <a:rPr lang="en-US" dirty="0" err="1" smtClean="0">
-                <a:solidFill>
-                  <a:schemeClr val="tx2">
-                    <a:lumMod val="60000"/>
-                    <a:lumOff val="40000"/>
-                  </a:schemeClr>
-                </a:solidFill>
-              </a:rPr>
-              <a:t>TransactionManager</a:t>
-            </a:r>
-            <a:r>
-              <a:rPr lang="en-US" dirty="0" smtClean="0">
-                <a:solidFill>
-                  <a:schemeClr val="tx2">
-                    <a:lumMod val="60000"/>
-                    <a:lumOff val="40000"/>
-                  </a:schemeClr>
-                </a:solidFill>
-              </a:rPr>
-              <a:t>) 			</a:t>
-            </a:r>
-            <a:r>
-              <a:rPr lang="en-US" dirty="0" err="1" smtClean="0">
-                <a:solidFill>
-                  <a:schemeClr val="tx2">
-                    <a:lumMod val="60000"/>
-                    <a:lumOff val="40000"/>
-                  </a:schemeClr>
-                </a:solidFill>
-              </a:rPr>
-              <a:t>txnClass.getMethod</a:t>
-            </a:r>
-            <a:r>
-              <a:rPr lang="en-US" dirty="0" smtClean="0">
-                <a:solidFill>
-                  <a:schemeClr val="tx2">
-                    <a:lumMod val="60000"/>
-                    <a:lumOff val="40000"/>
-                  </a:schemeClr>
-                </a:solidFill>
-              </a:rPr>
-              <a:t>(“</a:t>
-            </a:r>
-            <a:r>
-              <a:rPr lang="en-US" dirty="0" err="1" smtClean="0">
-                <a:solidFill>
-                  <a:schemeClr val="tx2">
-                    <a:lumMod val="60000"/>
-                    <a:lumOff val="40000"/>
-                  </a:schemeClr>
-                </a:solidFill>
-              </a:rPr>
-              <a:t>getTransactionManager</a:t>
-            </a:r>
-            <a:r>
-              <a:rPr lang="en-US" dirty="0" smtClean="0">
-                <a:solidFill>
-                  <a:schemeClr val="tx2">
-                    <a:lumMod val="60000"/>
-                    <a:lumOff val="40000"/>
-                  </a:schemeClr>
-                </a:solidFill>
-              </a:rPr>
-              <a:t>”, null)</a:t>
-            </a:r>
-          </a:p>
-          <a:p>
-            <a:pPr marL="457200" lvl="1" indent="0">
-              <a:buNone/>
-            </a:pPr>
-            <a:r>
-              <a:rPr lang="en-US" dirty="0" smtClean="0">
-                <a:solidFill>
-                  <a:schemeClr val="tx2">
-                    <a:lumMod val="60000"/>
-                    <a:lumOff val="40000"/>
-                  </a:schemeClr>
-                </a:solidFill>
-              </a:rPr>
-              <a:t>	.invoke(null, null);</a:t>
-            </a:r>
-            <a:endParaRPr lang="en-US" dirty="0">
-              <a:solidFill>
-                <a:schemeClr val="tx2">
-                  <a:lumMod val="60000"/>
-                  <a:lumOff val="40000"/>
-                </a:schemeClr>
-              </a:solidFill>
-            </a:endParaRPr>
-          </a:p>
-          <a:p>
-            <a:endParaRPr lang="en-US" dirty="0" smtClean="0"/>
+              <a:rPr lang="en-US" dirty="0" err="1" smtClean="0"/>
+              <a:t>SessionBean</a:t>
+            </a:r>
+            <a:r>
+              <a:rPr lang="en-US" dirty="0" smtClean="0"/>
+              <a:t> method and terminate it in a different </a:t>
+            </a:r>
+            <a:r>
+              <a:rPr lang="en-US" dirty="0" err="1" smtClean="0"/>
+              <a:t>Stateful</a:t>
+            </a:r>
+            <a:r>
+              <a:rPr lang="en-US" dirty="0" smtClean="0"/>
+              <a:t> </a:t>
+            </a:r>
+            <a:r>
+              <a:rPr lang="en-US" dirty="0" err="1" smtClean="0"/>
+              <a:t>SessionBean</a:t>
+            </a:r>
+            <a:r>
+              <a:rPr lang="en-US" dirty="0" smtClean="0"/>
+              <a:t> method</a:t>
+            </a:r>
+          </a:p>
+          <a:p>
+            <a:pPr lvl="1"/>
+            <a:r>
+              <a:rPr lang="en-US" dirty="0" smtClean="0"/>
+              <a:t>Poor Design</a:t>
+            </a:r>
+            <a:endParaRPr lang="en-US" dirty="0"/>
+          </a:p>
+          <a:p>
+            <a:endParaRPr lang="en-US" dirty="0"/>
           </a:p>
         </p:txBody>
       </p:sp>
@@ -9153,13 +9361,20 @@
     </p:spTree>
     <p:extLst>
       <p:ext uri="{BB962C8B-B14F-4D97-AF65-F5344CB8AC3E}">
-        <p14:creationId xmlns:p14="http://schemas.microsoft.com/office/powerpoint/2010/main" val="1473926500"/>
+        <p14:creationId xmlns:p14="http://schemas.microsoft.com/office/powerpoint/2010/main" val="1251644678"/>
       </p:ext>
     </p:extLst>
   </p:cSld>
   <p:clrMapOvr>
     <a:masterClrMapping/>
   </p:clrMapOvr>
+  <p:timing>
+    <p:tnLst>
+      <p:par>
+        <p:cTn id="1" dur="indefinite" restart="never" nodeType="tmRoot"/>
+      </p:par>
+    </p:tnLst>
+  </p:timing>
 </p:sld>
 </file>
 
@@ -9197,7 +9412,7 @@
           <a:p>
             <a:r>
               <a:rPr lang="en-US" dirty="0" smtClean="0"/>
-              <a:t>Declarative Transaction Model</a:t>
+              <a:t>Require traction control outside of the container</a:t>
             </a:r>
             <a:endParaRPr lang="en-US" dirty="0"/>
           </a:p>
@@ -9213,150 +9428,299 @@
             <p:ph idx="1"/>
           </p:nvPr>
         </p:nvSpPr>
-        <p:spPr>
-          <a:xfrm>
-            <a:off x="790574" y="1446213"/>
-            <a:ext cx="8101905" cy="4646612"/>
-          </a:xfrm>
-        </p:spPr>
-        <p:txBody>
-          <a:bodyPr>
-            <a:normAutofit fontScale="85000" lnSpcReduction="20000"/>
-          </a:bodyPr>
+        <p:spPr/>
+        <p:txBody>
+          <a:bodyPr/>
           <a:lstStyle/>
           <a:p>
             <a:r>
               <a:rPr lang="en-US" dirty="0" smtClean="0"/>
-              <a:t>Container-Managed Transactions (CMT)</a:t>
-            </a:r>
-          </a:p>
-          <a:p>
+              <a:t>Load the application-server specific </a:t>
+            </a:r>
+            <a:r>
+              <a:rPr lang="en-US" i="1" dirty="0" err="1" smtClean="0"/>
+              <a:t>TransactionManagerFactory</a:t>
+            </a:r>
+            <a:r>
+              <a:rPr lang="en-US" dirty="0" smtClean="0"/>
+              <a:t> class</a:t>
+            </a:r>
+          </a:p>
+          <a:p>
+            <a:pPr marL="457200" lvl="1" indent="0">
+              <a:buNone/>
+            </a:pPr>
+            <a:r>
+              <a:rPr lang="en-US" dirty="0" smtClean="0">
+                <a:solidFill>
+                  <a:schemeClr val="tx2">
+                    <a:lumMod val="60000"/>
+                    <a:lumOff val="40000"/>
+                  </a:schemeClr>
+                </a:solidFill>
+              </a:rPr>
+              <a:t>Class </a:t>
+            </a:r>
+            <a:r>
+              <a:rPr lang="en-US" dirty="0" err="1" smtClean="0">
+                <a:solidFill>
+                  <a:schemeClr val="tx2">
+                    <a:lumMod val="60000"/>
+                    <a:lumOff val="40000"/>
+                  </a:schemeClr>
+                </a:solidFill>
+              </a:rPr>
+              <a:t>txnClass</a:t>
+            </a:r>
+            <a:r>
+              <a:rPr lang="en-US" dirty="0" smtClean="0">
+                <a:solidFill>
+                  <a:schemeClr val="tx2">
+                    <a:lumMod val="60000"/>
+                    <a:lumOff val="40000"/>
+                  </a:schemeClr>
+                </a:solidFill>
+              </a:rPr>
+              <a:t> =</a:t>
+            </a:r>
+          </a:p>
+          <a:p>
+            <a:pPr marL="457200" lvl="1" indent="0">
+              <a:buNone/>
+            </a:pPr>
+            <a:r>
+              <a:rPr lang="en-US" dirty="0">
+                <a:solidFill>
+                  <a:schemeClr val="tx2">
+                    <a:lumMod val="60000"/>
+                    <a:lumOff val="40000"/>
+                  </a:schemeClr>
+                </a:solidFill>
+              </a:rPr>
+              <a:t>	</a:t>
+            </a:r>
+            <a:r>
+              <a:rPr lang="en-US" dirty="0" err="1" smtClean="0">
+                <a:solidFill>
+                  <a:schemeClr val="tx2">
+                    <a:lumMod val="60000"/>
+                    <a:lumOff val="40000"/>
+                  </a:schemeClr>
+                </a:solidFill>
+              </a:rPr>
+              <a:t>Class.forName</a:t>
+            </a:r>
+            <a:r>
+              <a:rPr lang="en-US" dirty="0" smtClean="0">
+                <a:solidFill>
+                  <a:schemeClr val="tx2">
+                    <a:lumMod val="60000"/>
+                    <a:lumOff val="40000"/>
+                  </a:schemeClr>
+                </a:solidFill>
+              </a:rPr>
+              <a:t>(“</a:t>
+            </a:r>
+            <a:r>
+              <a:rPr lang="en-US" i="1" dirty="0" err="1" smtClean="0">
+                <a:solidFill>
+                  <a:schemeClr val="accent1">
+                    <a:lumMod val="60000"/>
+                    <a:lumOff val="40000"/>
+                  </a:schemeClr>
+                </a:solidFill>
+              </a:rPr>
+              <a:t>com.ibm.ejs.jts.jta.TransactionManageFactory</a:t>
+            </a:r>
+            <a:r>
+              <a:rPr lang="en-US" dirty="0" smtClean="0">
+                <a:solidFill>
+                  <a:schemeClr val="tx2">
+                    <a:lumMod val="60000"/>
+                    <a:lumOff val="40000"/>
+                  </a:schemeClr>
+                </a:solidFill>
+              </a:rPr>
+              <a:t>”)</a:t>
+            </a:r>
+          </a:p>
+          <a:p>
+            <a:pPr marL="457200" lvl="1" indent="0">
+              <a:buNone/>
+            </a:pPr>
             <a:endParaRPr lang="en-US" dirty="0"/>
           </a:p>
           <a:p>
             <a:r>
               <a:rPr lang="en-US" dirty="0" smtClean="0"/>
-              <a:t>Transaction Attribute</a:t>
-            </a:r>
-          </a:p>
-          <a:p>
-            <a:pPr lvl="1"/>
-            <a:r>
-              <a:rPr lang="en-US" dirty="0" smtClean="0"/>
-              <a:t>Required (PROPAGATION_REQUIRED in Spring)</a:t>
-            </a:r>
-          </a:p>
-          <a:p>
-            <a:pPr lvl="2"/>
-            <a:r>
-              <a:rPr lang="en-US" dirty="0" smtClean="0"/>
-              <a:t>Transaction is needed; if there is no, create new one</a:t>
-            </a:r>
-          </a:p>
-          <a:p>
-            <a:pPr lvl="1"/>
-            <a:r>
-              <a:rPr lang="en-US" dirty="0" smtClean="0"/>
-              <a:t>Mandatory (PROPAGATION_MANDATORY in Spring)</a:t>
-            </a:r>
-          </a:p>
-          <a:p>
-            <a:pPr lvl="2"/>
-            <a:r>
-              <a:rPr lang="en-US" dirty="0" smtClean="0"/>
-              <a:t>Transaction is needed; if there is no, throw a exception</a:t>
-            </a:r>
-          </a:p>
-          <a:p>
-            <a:pPr lvl="1"/>
-            <a:r>
-              <a:rPr lang="en-US" dirty="0" smtClean="0"/>
-              <a:t>RequiresNew (PROPAGATION_REQUIRES_NEW in Spring)</a:t>
-            </a:r>
-          </a:p>
-          <a:p>
-            <a:pPr lvl="2"/>
-            <a:r>
-              <a:rPr lang="en-US" dirty="0" smtClean="0"/>
-              <a:t>Create a new transaction anyway</a:t>
-            </a:r>
-          </a:p>
-          <a:p>
-            <a:pPr lvl="1"/>
-            <a:r>
-              <a:rPr lang="en-US" dirty="0" smtClean="0"/>
-              <a:t>Supports (PROPAGATION_SUPPORTS in Spring)</a:t>
-            </a:r>
-          </a:p>
-          <a:p>
-            <a:pPr lvl="2"/>
-            <a:r>
-              <a:rPr lang="en-US" dirty="0" smtClean="0"/>
-              <a:t>Transaction is not mandatory; will be used if there is</a:t>
-            </a:r>
-          </a:p>
-          <a:p>
-            <a:pPr lvl="1"/>
-            <a:r>
-              <a:rPr lang="en-US" dirty="0" smtClean="0"/>
-              <a:t>NotSupported (PROPAGATION_NOT_SUPPORTED in Spring)</a:t>
-            </a:r>
-          </a:p>
-          <a:p>
-            <a:pPr lvl="2"/>
-            <a:r>
-              <a:rPr lang="en-US" dirty="0" smtClean="0"/>
-              <a:t>Transaction is not mandatory; will be suspended if there is</a:t>
-            </a:r>
-          </a:p>
-          <a:p>
-            <a:pPr lvl="1"/>
-            <a:r>
-              <a:rPr lang="en-US" dirty="0" smtClean="0"/>
-              <a:t>Never (PROPAGATION_NEVER in Spring)</a:t>
-            </a:r>
-          </a:p>
-          <a:p>
-            <a:pPr lvl="2"/>
-            <a:r>
-              <a:rPr lang="en-US" dirty="0" smtClean="0"/>
-              <a:t>Method cannot be invoked with a transaction</a:t>
-            </a:r>
-          </a:p>
-          <a:p>
-            <a:pPr lvl="1"/>
-            <a:endParaRPr lang="en-US" dirty="0"/>
-          </a:p>
-          <a:p>
-            <a:r>
-              <a:rPr lang="en-US" dirty="0" smtClean="0"/>
-              <a:t>In EJB spec</a:t>
-            </a:r>
-          </a:p>
-          <a:p>
-            <a:pPr lvl="1"/>
-            <a:r>
-              <a:rPr lang="en-US" dirty="0" smtClean="0"/>
-              <a:t>Entity Beans: Required, Mandatory, RequiresNew</a:t>
-            </a:r>
-          </a:p>
-          <a:p>
-            <a:pPr lvl="1"/>
-            <a:r>
-              <a:rPr lang="en-US" dirty="0" smtClean="0"/>
-              <a:t>Message Driven Beans: Required, NotSupported</a:t>
-            </a:r>
-          </a:p>
-          <a:p>
-            <a:pPr lvl="1"/>
-            <a:r>
-              <a:rPr lang="en-US" dirty="0" smtClean="0"/>
-              <a:t>Beans implemented Synchronization: Required, Mandatory, RequiresNew</a:t>
-            </a:r>
-          </a:p>
-          <a:p>
-            <a:pPr lvl="1"/>
-            <a:endParaRPr lang="en-US" dirty="0"/>
+              <a:t>Get </a:t>
+            </a:r>
+            <a:r>
+              <a:rPr lang="en-US" i="1" dirty="0" err="1" smtClean="0"/>
+              <a:t>TransactionManager</a:t>
+            </a:r>
+            <a:r>
+              <a:rPr lang="en-US" dirty="0" smtClean="0"/>
+              <a:t> by using reflection</a:t>
+            </a:r>
+          </a:p>
+          <a:p>
+            <a:pPr marL="457200" lvl="1" indent="0">
+              <a:buNone/>
+            </a:pPr>
+            <a:r>
+              <a:rPr lang="en-US" dirty="0" err="1" smtClean="0">
+                <a:solidFill>
+                  <a:schemeClr val="tx2">
+                    <a:lumMod val="60000"/>
+                    <a:lumOff val="40000"/>
+                  </a:schemeClr>
+                </a:solidFill>
+              </a:rPr>
+              <a:t>TransactionManager</a:t>
+            </a:r>
+            <a:r>
+              <a:rPr lang="en-US" dirty="0" smtClean="0">
+                <a:solidFill>
+                  <a:schemeClr val="tx2">
+                    <a:lumMod val="60000"/>
+                    <a:lumOff val="40000"/>
+                  </a:schemeClr>
+                </a:solidFill>
+              </a:rPr>
+              <a:t> </a:t>
+            </a:r>
+            <a:r>
+              <a:rPr lang="en-US" dirty="0" err="1" smtClean="0">
+                <a:solidFill>
+                  <a:schemeClr val="tx2">
+                    <a:lumMod val="60000"/>
+                    <a:lumOff val="40000"/>
+                  </a:schemeClr>
+                </a:solidFill>
+              </a:rPr>
+              <a:t>txnMgr</a:t>
+            </a:r>
+            <a:r>
+              <a:rPr lang="en-US" dirty="0" smtClean="0">
+                <a:solidFill>
+                  <a:schemeClr val="tx2">
+                    <a:lumMod val="60000"/>
+                    <a:lumOff val="40000"/>
+                  </a:schemeClr>
+                </a:solidFill>
+              </a:rPr>
+              <a:t> =</a:t>
+            </a:r>
+          </a:p>
+          <a:p>
+            <a:pPr marL="457200" lvl="1" indent="0">
+              <a:buNone/>
+            </a:pPr>
+            <a:r>
+              <a:rPr lang="en-US" dirty="0" smtClean="0">
+                <a:solidFill>
+                  <a:schemeClr val="tx2">
+                    <a:lumMod val="60000"/>
+                    <a:lumOff val="40000"/>
+                  </a:schemeClr>
+                </a:solidFill>
+              </a:rPr>
+              <a:t>	(</a:t>
+            </a:r>
+            <a:r>
+              <a:rPr lang="en-US" dirty="0" err="1" smtClean="0">
+                <a:solidFill>
+                  <a:schemeClr val="tx2">
+                    <a:lumMod val="60000"/>
+                    <a:lumOff val="40000"/>
+                  </a:schemeClr>
+                </a:solidFill>
+              </a:rPr>
+              <a:t>TransactionManager</a:t>
+            </a:r>
+            <a:r>
+              <a:rPr lang="en-US" dirty="0" smtClean="0">
+                <a:solidFill>
+                  <a:schemeClr val="tx2">
+                    <a:lumMod val="60000"/>
+                    <a:lumOff val="40000"/>
+                  </a:schemeClr>
+                </a:solidFill>
+              </a:rPr>
+              <a:t>) 			</a:t>
+            </a:r>
+            <a:r>
+              <a:rPr lang="en-US" dirty="0" err="1" smtClean="0">
+                <a:solidFill>
+                  <a:schemeClr val="tx2">
+                    <a:lumMod val="60000"/>
+                    <a:lumOff val="40000"/>
+                  </a:schemeClr>
+                </a:solidFill>
+              </a:rPr>
+              <a:t>txnClass.getMethod</a:t>
+            </a:r>
+            <a:r>
+              <a:rPr lang="en-US" dirty="0" smtClean="0">
+                <a:solidFill>
+                  <a:schemeClr val="tx2">
+                    <a:lumMod val="60000"/>
+                    <a:lumOff val="40000"/>
+                  </a:schemeClr>
+                </a:solidFill>
+              </a:rPr>
+              <a:t>(“</a:t>
+            </a:r>
+            <a:r>
+              <a:rPr lang="en-US" dirty="0" err="1" smtClean="0">
+                <a:solidFill>
+                  <a:schemeClr val="tx2">
+                    <a:lumMod val="60000"/>
+                    <a:lumOff val="40000"/>
+                  </a:schemeClr>
+                </a:solidFill>
+              </a:rPr>
+              <a:t>getTransactionManager</a:t>
+            </a:r>
+            <a:r>
+              <a:rPr lang="en-US" dirty="0" smtClean="0">
+                <a:solidFill>
+                  <a:schemeClr val="tx2">
+                    <a:lumMod val="60000"/>
+                    <a:lumOff val="40000"/>
+                  </a:schemeClr>
+                </a:solidFill>
+              </a:rPr>
+              <a:t>”, null)</a:t>
+            </a:r>
+          </a:p>
+          <a:p>
+            <a:pPr marL="457200" lvl="1" indent="0">
+              <a:buNone/>
+            </a:pPr>
+            <a:r>
+              <a:rPr lang="en-US" dirty="0" smtClean="0">
+                <a:solidFill>
+                  <a:schemeClr val="tx2">
+                    <a:lumMod val="60000"/>
+                    <a:lumOff val="40000"/>
+                  </a:schemeClr>
+                </a:solidFill>
+              </a:rPr>
+              <a:t>	.invoke(null, null);</a:t>
+            </a:r>
+            <a:endParaRPr lang="en-US" dirty="0">
+              <a:solidFill>
+                <a:schemeClr val="tx2">
+                  <a:lumMod val="60000"/>
+                  <a:lumOff val="40000"/>
+                </a:schemeClr>
+              </a:solidFill>
+            </a:endParaRPr>
+          </a:p>
+          <a:p>
+            <a:endParaRPr lang="en-US" dirty="0" smtClean="0"/>
           </a:p>
         </p:txBody>
       </p:sp>
@@ -9418,13 +9782,20 @@
     </p:spTree>
     <p:extLst>
       <p:ext uri="{BB962C8B-B14F-4D97-AF65-F5344CB8AC3E}">
-        <p14:creationId xmlns:p14="http://schemas.microsoft.com/office/powerpoint/2010/main" val="3016710951"/>
+        <p14:creationId xmlns:p14="http://schemas.microsoft.com/office/powerpoint/2010/main" val="1473926500"/>
       </p:ext>
     </p:extLst>
   </p:cSld>
   <p:clrMapOvr>
     <a:masterClrMapping/>
   </p:clrMapOvr>
+  <p:timing>
+    <p:tnLst>
+      <p:par>
+        <p:cTn id="1" dur="indefinite" restart="never" nodeType="tmRoot"/>
+      </p:par>
+    </p:tnLst>
+  </p:timing>
 </p:sld>
 </file>
 
@@ -9462,7 +9833,7 @@
           <a:p>
             <a:r>
               <a:rPr lang="en-US" dirty="0" smtClean="0"/>
-              <a:t>Sample for Supports &amp; NotSupported</a:t>
+              <a:t>Declarative Transaction Model</a:t>
             </a:r>
             <a:endParaRPr lang="en-US" dirty="0"/>
           </a:p>
@@ -9478,16 +9849,21 @@
             <p:ph idx="1"/>
           </p:nvPr>
         </p:nvSpPr>
-        <p:spPr/>
+        <p:spPr>
+          <a:xfrm>
+            <a:off x="790574" y="1446213"/>
+            <a:ext cx="8101905" cy="4646612"/>
+          </a:xfrm>
+        </p:spPr>
         <p:txBody>
           <a:bodyPr>
-            <a:normAutofit fontScale="92500"/>
+            <a:normAutofit fontScale="85000" lnSpcReduction="20000"/>
           </a:bodyPr>
           <a:lstStyle/>
           <a:p>
             <a:r>
               <a:rPr lang="en-US" dirty="0" smtClean="0"/>
-              <a:t>Assumption: Maximum 1 million shares a day for one trader</a:t>
+              <a:t>Container-Managed Transactions (CMT)</a:t>
             </a:r>
           </a:p>
           <a:p>
@@ -9496,101 +9872,123 @@
           <a:p>
             <a:r>
               <a:rPr lang="en-US" dirty="0" smtClean="0"/>
-              <a:t>If Supports</a:t>
+              <a:t>Transaction Attribute</a:t>
             </a:r>
           </a:p>
           <a:p>
             <a:pPr lvl="1"/>
             <a:r>
               <a:rPr lang="en-US" dirty="0" smtClean="0"/>
-              <a:t>Total shares traded so far 900,000</a:t>
+              <a:t>Required (PROPAGATION_REQUIRED in Spring)</a:t>
+            </a:r>
+          </a:p>
+          <a:p>
+            <a:pPr lvl="2"/>
+            <a:r>
+              <a:rPr lang="en-US" dirty="0" smtClean="0"/>
+              <a:t>Transaction is needed; if there is no, create new one</a:t>
             </a:r>
           </a:p>
           <a:p>
             <a:pPr lvl="1"/>
             <a:r>
               <a:rPr lang="en-US" dirty="0" smtClean="0"/>
-              <a:t>Start transaction</a:t>
+              <a:t>Mandatory (PROPAGATION_MANDATORY in Spring)</a:t>
+            </a:r>
+          </a:p>
+          <a:p>
+            <a:pPr lvl="2"/>
+            <a:r>
+              <a:rPr lang="en-US" dirty="0" smtClean="0"/>
+              <a:t>Transaction is needed; if there is no, throw a exception</a:t>
             </a:r>
           </a:p>
           <a:p>
             <a:pPr lvl="1"/>
             <a:r>
               <a:rPr lang="en-US" dirty="0" smtClean="0"/>
-              <a:t>Trader enters a trade for 200,000 shares</a:t>
+              <a:t>RequiresNew (PROPAGATION_REQUIRES_NEW in Spring)</a:t>
+            </a:r>
+          </a:p>
+          <a:p>
+            <a:pPr lvl="2"/>
+            <a:r>
+              <a:rPr lang="en-US" dirty="0" smtClean="0"/>
+              <a:t>Create a new transaction anyway</a:t>
             </a:r>
           </a:p>
           <a:p>
             <a:pPr lvl="1"/>
             <a:r>
               <a:rPr lang="en-US" dirty="0" smtClean="0"/>
-              <a:t>Query total shares, result = </a:t>
-            </a:r>
-            <a:r>
-              <a:rPr lang="en-US" u="sng" dirty="0" smtClean="0"/>
-              <a:t>1,100,000</a:t>
+              <a:t>Supports (PROPAGATION_SUPPORTS in Spring)</a:t>
+            </a:r>
+          </a:p>
+          <a:p>
+            <a:pPr lvl="2"/>
+            <a:r>
+              <a:rPr lang="en-US" dirty="0" smtClean="0"/>
+              <a:t>Transaction is not mandatory; will be used if there is</a:t>
             </a:r>
           </a:p>
           <a:p>
             <a:pPr lvl="1"/>
             <a:r>
               <a:rPr lang="en-US" dirty="0" smtClean="0"/>
-              <a:t>Exception thrown. Transaction rollback</a:t>
-            </a:r>
-          </a:p>
-          <a:p>
+              <a:t>NotSupported (PROPAGATION_NOT_SUPPORTED in Spring)</a:t>
+            </a:r>
+          </a:p>
+          <a:p>
+            <a:pPr lvl="2"/>
+            <a:r>
+              <a:rPr lang="en-US" dirty="0" smtClean="0"/>
+              <a:t>Transaction is not mandatory; will be suspended if there is</a:t>
+            </a:r>
+          </a:p>
+          <a:p>
+            <a:pPr lvl="1"/>
+            <a:r>
+              <a:rPr lang="en-US" dirty="0" smtClean="0"/>
+              <a:t>Never (PROPAGATION_NEVER in Spring)</a:t>
+            </a:r>
+          </a:p>
+          <a:p>
+            <a:pPr lvl="2"/>
+            <a:r>
+              <a:rPr lang="en-US" dirty="0" smtClean="0"/>
+              <a:t>Method cannot be invoked with a transaction</a:t>
+            </a:r>
+          </a:p>
+          <a:p>
+            <a:pPr lvl="1"/>
             <a:endParaRPr lang="en-US" dirty="0"/>
           </a:p>
           <a:p>
             <a:r>
               <a:rPr lang="en-US" dirty="0" smtClean="0"/>
-              <a:t>If NotSupported</a:t>
+              <a:t>In EJB spec</a:t>
             </a:r>
           </a:p>
           <a:p>
             <a:pPr lvl="1"/>
             <a:r>
-              <a:rPr lang="en-US" dirty="0"/>
-              <a:t>Total shares traded so far 900,000</a:t>
+              <a:rPr lang="en-US" dirty="0" smtClean="0"/>
+              <a:t>Entity Beans: Required, Mandatory, RequiresNew</a:t>
             </a:r>
           </a:p>
           <a:p>
             <a:pPr lvl="1"/>
             <a:r>
-              <a:rPr lang="en-US" dirty="0"/>
-              <a:t>Start transaction</a:t>
+              <a:rPr lang="en-US" dirty="0" smtClean="0"/>
+              <a:t>Message Driven Beans: Required, NotSupported</a:t>
             </a:r>
           </a:p>
           <a:p>
             <a:pPr lvl="1"/>
             <a:r>
-              <a:rPr lang="en-US" dirty="0"/>
-              <a:t>Trader enters a trade for 200,000 shares</a:t>
-            </a:r>
-          </a:p>
-          <a:p>
-            <a:pPr lvl="1"/>
-            <a:r>
-              <a:rPr lang="en-US" dirty="0"/>
-              <a:t>Query total shares, result = </a:t>
-            </a:r>
-            <a:r>
-              <a:rPr lang="en-US" u="sng" dirty="0"/>
-              <a:t>9</a:t>
-            </a:r>
-            <a:r>
-              <a:rPr lang="en-US" u="sng" dirty="0" smtClean="0"/>
-              <a:t>00,000</a:t>
-            </a:r>
-            <a:endParaRPr lang="en-US" u="sng" dirty="0"/>
-          </a:p>
-          <a:p>
-            <a:pPr lvl="1"/>
-            <a:r>
-              <a:rPr lang="en-US" dirty="0" smtClean="0"/>
-              <a:t>Trade allowed. Transaction committed</a:t>
-            </a:r>
-            <a:endParaRPr lang="en-US" dirty="0"/>
+              <a:rPr lang="en-US" dirty="0" smtClean="0"/>
+              <a:t>Beans implemented Synchronization: Required, Mandatory, RequiresNew</a:t>
+            </a:r>
           </a:p>
           <a:p>
             <a:pPr lvl="1"/>
@@ -9656,13 +10054,20 @@
     </p:spTree>
     <p:extLst>
       <p:ext uri="{BB962C8B-B14F-4D97-AF65-F5344CB8AC3E}">
-        <p14:creationId xmlns:p14="http://schemas.microsoft.com/office/powerpoint/2010/main" val="3794357245"/>
+        <p14:creationId xmlns:p14="http://schemas.microsoft.com/office/powerpoint/2010/main" val="3016710951"/>
       </p:ext>
     </p:extLst>
   </p:cSld>
   <p:clrMapOvr>
     <a:masterClrMapping/>
   </p:clrMapOvr>
+  <p:timing>
+    <p:tnLst>
+      <p:par>
+        <p:cTn id="1" dur="indefinite" restart="never" nodeType="tmRoot"/>
+      </p:par>
+    </p:tnLst>
+  </p:timing>
 </p:sld>
 </file>
 
@@ -9700,7 +10105,7 @@
           <a:p>
             <a:r>
               <a:rPr lang="en-US" dirty="0" smtClean="0"/>
-              <a:t>Exception handling and setRollback()</a:t>
+              <a:t>Sample for Supports &amp; NotSupported</a:t>
             </a:r>
             <a:endParaRPr lang="en-US" dirty="0"/>
           </a:p>
@@ -9716,122 +10121,122 @@
             <p:ph idx="1"/>
           </p:nvPr>
         </p:nvSpPr>
-        <p:spPr>
-          <a:xfrm>
-            <a:off x="790574" y="1446213"/>
-            <a:ext cx="8245921" cy="4646612"/>
-          </a:xfrm>
-        </p:spPr>
+        <p:spPr/>
         <p:txBody>
           <a:bodyPr>
-            <a:normAutofit lnSpcReduction="10000"/>
+            <a:normAutofit fontScale="92500"/>
           </a:bodyPr>
           <a:lstStyle/>
           <a:p>
             <a:r>
               <a:rPr lang="en-US" dirty="0" smtClean="0"/>
-              <a:t>The container will NOT mark the transaction for rollback on an application exception</a:t>
-            </a:r>
-          </a:p>
-          <a:p>
-            <a:endParaRPr lang="en-US" dirty="0" smtClean="0"/>
-          </a:p>
-          <a:p>
+              <a:t>Assumption: Maximum 1 million shares a day for one trader</a:t>
+            </a:r>
+          </a:p>
+          <a:p>
+            <a:endParaRPr lang="en-US" dirty="0"/>
+          </a:p>
+          <a:p>
+            <a:r>
+              <a:rPr lang="en-US" dirty="0" smtClean="0"/>
+              <a:t>If Supports</a:t>
+            </a:r>
+          </a:p>
+          <a:p>
+            <a:pPr lvl="1"/>
+            <a:r>
+              <a:rPr lang="en-US" dirty="0" smtClean="0"/>
+              <a:t>Total shares traded so far 900,000</a:t>
+            </a:r>
+          </a:p>
+          <a:p>
+            <a:pPr lvl="1"/>
+            <a:r>
+              <a:rPr lang="en-US" dirty="0" smtClean="0"/>
+              <a:t>Start transaction</a:t>
+            </a:r>
+          </a:p>
+          <a:p>
+            <a:pPr lvl="1"/>
+            <a:r>
+              <a:rPr lang="en-US" dirty="0" smtClean="0"/>
+              <a:t>Trader enters a trade for 200,000 shares</a:t>
+            </a:r>
+          </a:p>
+          <a:p>
+            <a:pPr lvl="1"/>
+            <a:r>
+              <a:rPr lang="en-US" dirty="0" smtClean="0"/>
+              <a:t>Query total shares, result = </a:t>
+            </a:r>
+            <a:r>
+              <a:rPr lang="en-US" u="sng" dirty="0" smtClean="0"/>
+              <a:t>1,100,000</a:t>
+            </a:r>
+          </a:p>
+          <a:p>
+            <a:pPr lvl="1"/>
+            <a:r>
+              <a:rPr lang="en-US" dirty="0" smtClean="0"/>
+              <a:t>Exception thrown. Transaction rollback</a:t>
+            </a:r>
+          </a:p>
+          <a:p>
+            <a:endParaRPr lang="en-US" dirty="0"/>
+          </a:p>
+          <a:p>
+            <a:r>
+              <a:rPr lang="en-US" dirty="0" smtClean="0"/>
+              <a:t>If NotSupported</a:t>
+            </a:r>
+          </a:p>
+          <a:p>
+            <a:pPr lvl="1"/>
             <a:r>
               <a:rPr lang="en-US" dirty="0"/>
-              <a:t>setRollbackOnly</a:t>
-            </a:r>
-            <a:r>
-              <a:rPr lang="en-US" dirty="0" smtClean="0"/>
-              <a:t>()</a:t>
+              <a:t>Total shares traded so far 900,000</a:t>
             </a:r>
           </a:p>
           <a:p>
             <a:pPr lvl="1"/>
             <a:r>
-              <a:rPr lang="en-US" dirty="0" smtClean="0"/>
-              <a:t>Best Practice: Only the method that started the transaction should invoke the setRollbackOnly() method</a:t>
-            </a:r>
-          </a:p>
-          <a:p>
-            <a:pPr lvl="2"/>
-            <a:r>
-              <a:rPr lang="en-US" dirty="0" smtClean="0"/>
-              <a:t>Simple component responsibility</a:t>
-            </a:r>
-          </a:p>
-          <a:p>
-            <a:pPr lvl="2"/>
-            <a:r>
-              <a:rPr lang="en-US" dirty="0" smtClean="0"/>
-              <a:t>Method setRollbackOnly() cannot be reversed</a:t>
+              <a:rPr lang="en-US" dirty="0"/>
+              <a:t>Start transaction</a:t>
             </a:r>
           </a:p>
           <a:p>
             <a:pPr lvl="1"/>
             <a:r>
-              <a:rPr lang="en-US" dirty="0" smtClean="0"/>
-              <a:t>Throw </a:t>
-            </a:r>
-            <a:r>
-              <a:rPr lang="en-US" dirty="0" err="1" smtClean="0"/>
-              <a:t>java.lang.IllegalStateException</a:t>
-            </a:r>
-            <a:r>
-              <a:rPr lang="en-US" dirty="0" smtClean="0"/>
-              <a:t> if business method annotated by Supports/</a:t>
-            </a:r>
-            <a:r>
-              <a:rPr lang="en-US" dirty="0" err="1" smtClean="0"/>
-              <a:t>NotSpported</a:t>
-            </a:r>
-            <a:r>
-              <a:rPr lang="en-US" dirty="0" smtClean="0"/>
-              <a:t>/Never when invoke setRollbackOnly()</a:t>
+              <a:rPr lang="en-US" dirty="0"/>
+              <a:t>Trader enters a trade for 200,000 shares</a:t>
             </a:r>
           </a:p>
           <a:p>
             <a:pPr lvl="1"/>
+            <a:r>
+              <a:rPr lang="en-US" dirty="0"/>
+              <a:t>Query total shares, result = </a:t>
+            </a:r>
+            <a:r>
+              <a:rPr lang="en-US" u="sng" dirty="0"/>
+              <a:t>9</a:t>
+            </a:r>
+            <a:r>
+              <a:rPr lang="en-US" u="sng" dirty="0" smtClean="0"/>
+              <a:t>00,000</a:t>
+            </a:r>
+            <a:endParaRPr lang="en-US" u="sng" dirty="0"/>
+          </a:p>
+          <a:p>
+            <a:pPr lvl="1"/>
+            <a:r>
+              <a:rPr lang="en-US" dirty="0" smtClean="0"/>
+              <a:t>Trade allowed. Transaction committed</a:t>
+            </a:r>
             <a:endParaRPr lang="en-US" dirty="0"/>
           </a:p>
           <a:p>
-            <a:r>
-              <a:rPr lang="en-US" dirty="0" smtClean="0"/>
-              <a:t>@ApplicationException(rollback=true)</a:t>
-            </a:r>
-          </a:p>
-          <a:p>
             <a:pPr lvl="1"/>
-            <a:r>
-              <a:rPr lang="en-US" dirty="0" smtClean="0"/>
-              <a:t>Will be ignore if there is no transaction</a:t>
-            </a:r>
-          </a:p>
-          <a:p>
-            <a:pPr lvl="1"/>
-            <a:endParaRPr lang="en-US" dirty="0"/>
-          </a:p>
-          <a:p>
-            <a:r>
-              <a:rPr lang="en-US" dirty="0" err="1" smtClean="0"/>
-              <a:t>RuntimeException</a:t>
-            </a:r>
-            <a:r>
-              <a:rPr lang="en-US" dirty="0" smtClean="0"/>
-              <a:t>: </a:t>
-            </a:r>
-            <a:r>
-              <a:rPr lang="en-US" dirty="0" err="1" smtClean="0"/>
-              <a:t>javax.ejb.EJBException</a:t>
-            </a:r>
-            <a:endParaRPr lang="en-US" dirty="0" smtClean="0"/>
-          </a:p>
-          <a:p>
-            <a:pPr lvl="1"/>
-            <a:r>
-              <a:rPr lang="en-US" dirty="0" smtClean="0"/>
-              <a:t>Disadvantage: lost information</a:t>
-            </a:r>
             <a:endParaRPr lang="en-US" dirty="0"/>
           </a:p>
         </p:txBody>
@@ -9894,13 +10299,20 @@
     </p:spTree>
     <p:extLst>
       <p:ext uri="{BB962C8B-B14F-4D97-AF65-F5344CB8AC3E}">
-        <p14:creationId xmlns:p14="http://schemas.microsoft.com/office/powerpoint/2010/main" val="999776291"/>
+        <p14:creationId xmlns:p14="http://schemas.microsoft.com/office/powerpoint/2010/main" val="3794357245"/>
       </p:ext>
     </p:extLst>
   </p:cSld>
   <p:clrMapOvr>
     <a:masterClrMapping/>
   </p:clrMapOvr>
+  <p:timing>
+    <p:tnLst>
+      <p:par>
+        <p:cTn id="1" dur="indefinite" restart="never" nodeType="tmRoot"/>
+      </p:par>
+    </p:tnLst>
+  </p:timing>
 </p:sld>
 </file>
 
@@ -9938,7 +10350,7 @@
           <a:p>
             <a:r>
               <a:rPr lang="en-US" dirty="0" smtClean="0"/>
-              <a:t>Transaction Isolation Level</a:t>
+              <a:t>Exception handling and setRollback()</a:t>
             </a:r>
             <a:endParaRPr lang="en-US" dirty="0"/>
           </a:p>
@@ -9962,152 +10374,113 @@
         </p:spPr>
         <p:txBody>
           <a:bodyPr>
-            <a:normAutofit fontScale="85000" lnSpcReduction="10000"/>
+            <a:normAutofit lnSpcReduction="10000"/>
           </a:bodyPr>
           <a:lstStyle/>
           <a:p>
             <a:r>
               <a:rPr lang="en-US" dirty="0" smtClean="0"/>
-              <a:t>It determines the visibility of updates a transaction will allow when other transactions are accessing and updating the same data</a:t>
-            </a:r>
-          </a:p>
-          <a:p>
+              <a:t>The container will NOT mark the transaction for rollback on an application exception</a:t>
+            </a:r>
+          </a:p>
+          <a:p>
+            <a:endParaRPr lang="en-US" dirty="0" smtClean="0"/>
+          </a:p>
+          <a:p>
+            <a:r>
+              <a:rPr lang="en-US" dirty="0"/>
+              <a:t>setRollbackOnly</a:t>
+            </a:r>
+            <a:r>
+              <a:rPr lang="en-US" dirty="0" smtClean="0"/>
+              <a:t>()</a:t>
+            </a:r>
+          </a:p>
+          <a:p>
+            <a:pPr lvl="1"/>
+            <a:r>
+              <a:rPr lang="en-US" dirty="0" smtClean="0"/>
+              <a:t>Best Practice: Only the method that started the transaction should invoke the setRollbackOnly() method</a:t>
+            </a:r>
+          </a:p>
+          <a:p>
+            <a:pPr lvl="2"/>
+            <a:r>
+              <a:rPr lang="en-US" dirty="0" smtClean="0"/>
+              <a:t>Simple component responsibility</a:t>
+            </a:r>
+          </a:p>
+          <a:p>
+            <a:pPr lvl="2"/>
+            <a:r>
+              <a:rPr lang="en-US" dirty="0" smtClean="0"/>
+              <a:t>Method setRollbackOnly() cannot be reversed</a:t>
+            </a:r>
+          </a:p>
+          <a:p>
+            <a:pPr lvl="1"/>
+            <a:r>
+              <a:rPr lang="en-US" dirty="0" smtClean="0"/>
+              <a:t>Throw </a:t>
+            </a:r>
+            <a:r>
+              <a:rPr lang="en-US" dirty="0" err="1" smtClean="0"/>
+              <a:t>java.lang.IllegalStateException</a:t>
+            </a:r>
+            <a:r>
+              <a:rPr lang="en-US" dirty="0" smtClean="0"/>
+              <a:t> if business method annotated by Supports/</a:t>
+            </a:r>
+            <a:r>
+              <a:rPr lang="en-US" dirty="0" err="1" smtClean="0"/>
+              <a:t>NotSpported</a:t>
+            </a:r>
+            <a:r>
+              <a:rPr lang="en-US" dirty="0" smtClean="0"/>
+              <a:t>/Never when invoke setRollbackOnly()</a:t>
+            </a:r>
+          </a:p>
+          <a:p>
+            <a:pPr lvl="1"/>
             <a:endParaRPr lang="en-US" dirty="0"/>
           </a:p>
           <a:p>
             <a:r>
               <a:rPr lang="en-US" dirty="0" smtClean="0"/>
-              <a:t>Configured in DBMS / EJB / Spring, effect on both application and database</a:t>
-            </a:r>
-          </a:p>
-          <a:p>
+              <a:t>@ApplicationException(rollback=true)</a:t>
+            </a:r>
+          </a:p>
+          <a:p>
+            <a:pPr lvl="1"/>
+            <a:r>
+              <a:rPr lang="en-US" dirty="0" smtClean="0"/>
+              <a:t>Will be ignore if there is no transaction</a:t>
+            </a:r>
+          </a:p>
+          <a:p>
+            <a:pPr lvl="1"/>
             <a:endParaRPr lang="en-US" dirty="0"/>
           </a:p>
           <a:p>
             <a:r>
-              <a:rPr lang="en-US" dirty="0" smtClean="0"/>
-              <a:t>Concurrency </a:t>
-            </a:r>
-            <a:r>
-              <a:rPr lang="en-US" dirty="0" smtClean="0">
-                <a:sym typeface="Wingdings" panose="05000000000000000000" pitchFamily="2" charset="2"/>
-              </a:rPr>
-              <a:t> Consistency</a:t>
-            </a:r>
-          </a:p>
-          <a:p>
-            <a:endParaRPr lang="en-US" dirty="0">
-              <a:sym typeface="Wingdings" panose="05000000000000000000" pitchFamily="2" charset="2"/>
-            </a:endParaRPr>
-          </a:p>
-          <a:p>
-            <a:r>
-              <a:rPr lang="en-US" dirty="0" smtClean="0">
-                <a:sym typeface="Wingdings" panose="05000000000000000000" pitchFamily="2" charset="2"/>
-              </a:rPr>
-              <a:t>Four Primary Isolation Levels:</a:t>
-            </a:r>
+              <a:rPr lang="en-US" dirty="0" err="1" smtClean="0"/>
+              <a:t>RuntimeException</a:t>
+            </a:r>
+            <a:r>
+              <a:rPr lang="en-US" dirty="0" smtClean="0"/>
+              <a:t>: </a:t>
+            </a:r>
+            <a:r>
+              <a:rPr lang="en-US" dirty="0" err="1" smtClean="0"/>
+              <a:t>javax.ejb.EJBException</a:t>
+            </a:r>
+            <a:endParaRPr lang="en-US" dirty="0" smtClean="0"/>
           </a:p>
           <a:p>
             <a:pPr lvl="1"/>
             <a:r>
-              <a:rPr lang="en-US" dirty="0" smtClean="0">
-                <a:sym typeface="Wingdings" panose="05000000000000000000" pitchFamily="2" charset="2"/>
-              </a:rPr>
-              <a:t>TransactionReadUncommitted</a:t>
-            </a:r>
-          </a:p>
-          <a:p>
-            <a:pPr lvl="2"/>
-            <a:r>
-              <a:rPr lang="en-US" dirty="0" smtClean="0">
-                <a:sym typeface="Wingdings" panose="05000000000000000000" pitchFamily="2" charset="2"/>
-              </a:rPr>
-              <a:t>Read non-committed updates made by other transactions</a:t>
-            </a:r>
-            <a:endParaRPr lang="en-US" dirty="0">
-              <a:sym typeface="Wingdings" panose="05000000000000000000" pitchFamily="2" charset="2"/>
-            </a:endParaRPr>
-          </a:p>
-          <a:p>
-            <a:pPr lvl="1"/>
-            <a:r>
-              <a:rPr lang="en-US" dirty="0" smtClean="0">
-                <a:sym typeface="Wingdings" panose="05000000000000000000" pitchFamily="2" charset="2"/>
-              </a:rPr>
-              <a:t>TransactionReadCommitted</a:t>
-            </a:r>
-          </a:p>
-          <a:p>
-            <a:pPr lvl="2"/>
-            <a:r>
-              <a:rPr lang="en-US" dirty="0" smtClean="0">
-                <a:sym typeface="Wingdings" panose="05000000000000000000" pitchFamily="2" charset="2"/>
-              </a:rPr>
-              <a:t>Hides non-committed updates made by other transactions</a:t>
-            </a:r>
-          </a:p>
-          <a:p>
-            <a:pPr lvl="2"/>
-            <a:r>
-              <a:rPr lang="en-US" dirty="0" smtClean="0">
-                <a:sym typeface="Wingdings" panose="05000000000000000000" pitchFamily="2" charset="2"/>
-              </a:rPr>
-              <a:t>Default isolation setting</a:t>
-            </a:r>
-          </a:p>
-          <a:p>
-            <a:pPr lvl="1"/>
-            <a:r>
-              <a:rPr lang="en-US" dirty="0" smtClean="0">
-                <a:sym typeface="Wingdings" panose="05000000000000000000" pitchFamily="2" charset="2"/>
-              </a:rPr>
-              <a:t>TransactionRepeatableRead</a:t>
-            </a:r>
-          </a:p>
-          <a:p>
-            <a:pPr lvl="2"/>
-            <a:r>
-              <a:rPr lang="en-US" dirty="0" smtClean="0">
-                <a:sym typeface="Wingdings" panose="05000000000000000000" pitchFamily="2" charset="2"/>
-              </a:rPr>
-              <a:t>Same set of values will be read every time the select statement is executed in one transaction</a:t>
-            </a:r>
-          </a:p>
-          <a:p>
-            <a:pPr lvl="2"/>
-            <a:r>
-              <a:rPr lang="en-US" dirty="0" smtClean="0">
-                <a:sym typeface="Wingdings" panose="05000000000000000000" pitchFamily="2" charset="2"/>
-              </a:rPr>
-              <a:t>Both read and write locks are placed on the data being queried and modified</a:t>
-            </a:r>
-          </a:p>
-          <a:p>
-            <a:pPr lvl="1"/>
-            <a:r>
-              <a:rPr lang="en-US" dirty="0" smtClean="0">
-                <a:sym typeface="Wingdings" panose="05000000000000000000" pitchFamily="2" charset="2"/>
-              </a:rPr>
-              <a:t>TransactionSerializable</a:t>
-            </a:r>
-          </a:p>
-          <a:p>
-            <a:pPr lvl="2"/>
-            <a:r>
-              <a:rPr lang="en-US" dirty="0" smtClean="0">
-                <a:sym typeface="Wingdings" panose="05000000000000000000" pitchFamily="2" charset="2"/>
-              </a:rPr>
-              <a:t>Lowest level supported by Java</a:t>
-            </a:r>
-          </a:p>
-          <a:p>
-            <a:pPr lvl="2"/>
-            <a:r>
-              <a:rPr lang="en-US" dirty="0" smtClean="0">
-                <a:sym typeface="Wingdings" panose="05000000000000000000" pitchFamily="2" charset="2"/>
-              </a:rPr>
-              <a:t>Only one transaction is allowed access to the data at a time</a:t>
+              <a:rPr lang="en-US" dirty="0" smtClean="0"/>
+              <a:t>Disadvantage: lost information</a:t>
             </a:r>
             <a:endParaRPr lang="en-US" dirty="0"/>
           </a:p>
@@ -10171,13 +10544,20 @@
     </p:spTree>
     <p:extLst>
       <p:ext uri="{BB962C8B-B14F-4D97-AF65-F5344CB8AC3E}">
-        <p14:creationId xmlns:p14="http://schemas.microsoft.com/office/powerpoint/2010/main" val="2019302905"/>
+        <p14:creationId xmlns:p14="http://schemas.microsoft.com/office/powerpoint/2010/main" val="999776291"/>
       </p:ext>
     </p:extLst>
   </p:cSld>
   <p:clrMapOvr>
     <a:masterClrMapping/>
   </p:clrMapOvr>
+  <p:timing>
+    <p:tnLst>
+      <p:par>
+        <p:cTn id="1" dur="indefinite" restart="never" nodeType="tmRoot"/>
+      </p:par>
+    </p:tnLst>
+  </p:timing>
 </p:sld>
 </file>
 
@@ -10200,6 +10580,198 @@
       </p:grpSpPr>
       <p:sp>
         <p:nvSpPr>
+          <p:cNvPr id="2" name="Title 1"/>
+          <p:cNvSpPr>
+            <a:spLocks noGrp="1"/>
+          </p:cNvSpPr>
+          <p:nvPr>
+            <p:ph type="title"/>
+          </p:nvPr>
+        </p:nvSpPr>
+        <p:spPr/>
+        <p:txBody>
+          <a:bodyPr/>
+          <a:lstStyle/>
+          <a:p>
+            <a:r>
+              <a:rPr lang="en-US" dirty="0" smtClean="0"/>
+              <a:t>Transaction Isolation Level</a:t>
+            </a:r>
+            <a:endParaRPr lang="en-US" dirty="0"/>
+          </a:p>
+        </p:txBody>
+      </p:sp>
+      <p:sp>
+        <p:nvSpPr>
+          <p:cNvPr id="3" name="Content Placeholder 2"/>
+          <p:cNvSpPr>
+            <a:spLocks noGrp="1"/>
+          </p:cNvSpPr>
+          <p:nvPr>
+            <p:ph idx="1"/>
+          </p:nvPr>
+        </p:nvSpPr>
+        <p:spPr>
+          <a:xfrm>
+            <a:off x="790574" y="1446213"/>
+            <a:ext cx="8245921" cy="4646612"/>
+          </a:xfrm>
+        </p:spPr>
+        <p:txBody>
+          <a:bodyPr>
+            <a:normAutofit fontScale="85000" lnSpcReduction="10000"/>
+          </a:bodyPr>
+          <a:lstStyle/>
+          <a:p>
+            <a:r>
+              <a:rPr lang="en-US" dirty="0" smtClean="0"/>
+              <a:t>It determines the visibility of updates a transaction will allow when other transactions are accessing and updating the same data</a:t>
+            </a:r>
+          </a:p>
+          <a:p>
+            <a:endParaRPr lang="en-US" dirty="0"/>
+          </a:p>
+          <a:p>
+            <a:r>
+              <a:rPr lang="en-US" dirty="0" smtClean="0"/>
+              <a:t>Configured in DBMS / EJB / Spring, effect on both application and database</a:t>
+            </a:r>
+          </a:p>
+          <a:p>
+            <a:endParaRPr lang="en-US" dirty="0"/>
+          </a:p>
+          <a:p>
+            <a:r>
+              <a:rPr lang="en-US" dirty="0" smtClean="0"/>
+              <a:t>Concurrency </a:t>
+            </a:r>
+            <a:r>
+              <a:rPr lang="en-US" dirty="0" smtClean="0">
+                <a:sym typeface="Wingdings" panose="05000000000000000000" pitchFamily="2" charset="2"/>
+              </a:rPr>
+              <a:t> Consistency</a:t>
+            </a:r>
+          </a:p>
+          <a:p>
+            <a:endParaRPr lang="en-US" dirty="0">
+              <a:sym typeface="Wingdings" panose="05000000000000000000" pitchFamily="2" charset="2"/>
+            </a:endParaRPr>
+          </a:p>
+          <a:p>
+            <a:r>
+              <a:rPr lang="en-US" dirty="0" smtClean="0">
+                <a:sym typeface="Wingdings" panose="05000000000000000000" pitchFamily="2" charset="2"/>
+              </a:rPr>
+              <a:t>Four Primary Isolation Levels:</a:t>
+            </a:r>
+          </a:p>
+          <a:p>
+            <a:pPr lvl="1"/>
+            <a:r>
+              <a:rPr lang="en-US" dirty="0" smtClean="0">
+                <a:sym typeface="Wingdings" panose="05000000000000000000" pitchFamily="2" charset="2"/>
+              </a:rPr>
+              <a:t>TransactionReadUncommitted</a:t>
+            </a:r>
+          </a:p>
+          <a:p>
+            <a:pPr lvl="2"/>
+            <a:r>
+              <a:rPr lang="en-US" dirty="0" smtClean="0">
+                <a:sym typeface="Wingdings" panose="05000000000000000000" pitchFamily="2" charset="2"/>
+              </a:rPr>
+              <a:t>Read non-committed updates made by other transactions</a:t>
+            </a:r>
+            <a:endParaRPr lang="en-US" dirty="0">
+              <a:sym typeface="Wingdings" panose="05000000000000000000" pitchFamily="2" charset="2"/>
+            </a:endParaRPr>
+          </a:p>
+          <a:p>
+            <a:pPr lvl="1"/>
+            <a:r>
+              <a:rPr lang="en-US" dirty="0" smtClean="0">
+                <a:sym typeface="Wingdings" panose="05000000000000000000" pitchFamily="2" charset="2"/>
+              </a:rPr>
+              <a:t>TransactionReadCommitted</a:t>
+            </a:r>
+          </a:p>
+          <a:p>
+            <a:pPr lvl="2"/>
+            <a:r>
+              <a:rPr lang="en-US" dirty="0" smtClean="0">
+                <a:sym typeface="Wingdings" panose="05000000000000000000" pitchFamily="2" charset="2"/>
+              </a:rPr>
+              <a:t>Hides non-committed updates made by other transactions</a:t>
+            </a:r>
+          </a:p>
+          <a:p>
+            <a:pPr lvl="2"/>
+            <a:r>
+              <a:rPr lang="en-US" dirty="0" smtClean="0">
+                <a:sym typeface="Wingdings" panose="05000000000000000000" pitchFamily="2" charset="2"/>
+              </a:rPr>
+              <a:t>Default isolation setting</a:t>
+            </a:r>
+          </a:p>
+          <a:p>
+            <a:pPr lvl="1"/>
+            <a:r>
+              <a:rPr lang="en-US" dirty="0" smtClean="0">
+                <a:sym typeface="Wingdings" panose="05000000000000000000" pitchFamily="2" charset="2"/>
+              </a:rPr>
+              <a:t>TransactionRepeatableRead</a:t>
+            </a:r>
+          </a:p>
+          <a:p>
+            <a:pPr lvl="2"/>
+            <a:r>
+              <a:rPr lang="en-US" dirty="0" smtClean="0">
+                <a:sym typeface="Wingdings" panose="05000000000000000000" pitchFamily="2" charset="2"/>
+              </a:rPr>
+              <a:t>Same set of values will be read every time the select statement is executed in one transaction</a:t>
+            </a:r>
+          </a:p>
+          <a:p>
+            <a:pPr lvl="2"/>
+            <a:r>
+              <a:rPr lang="en-US" dirty="0" smtClean="0">
+                <a:sym typeface="Wingdings" panose="05000000000000000000" pitchFamily="2" charset="2"/>
+              </a:rPr>
+              <a:t>Both read and write locks are placed on the data being queried and modified</a:t>
+            </a:r>
+          </a:p>
+          <a:p>
+            <a:pPr lvl="1"/>
+            <a:r>
+              <a:rPr lang="en-US" dirty="0" smtClean="0">
+                <a:sym typeface="Wingdings" panose="05000000000000000000" pitchFamily="2" charset="2"/>
+              </a:rPr>
+              <a:t>TransactionSerializable</a:t>
+            </a:r>
+          </a:p>
+          <a:p>
+            <a:pPr lvl="2"/>
+            <a:r>
+              <a:rPr lang="en-US" dirty="0" smtClean="0">
+                <a:sym typeface="Wingdings" panose="05000000000000000000" pitchFamily="2" charset="2"/>
+              </a:rPr>
+              <a:t>Lowest level supported by Java</a:t>
+            </a:r>
+          </a:p>
+          <a:p>
+            <a:pPr lvl="2"/>
+            <a:r>
+              <a:rPr lang="en-US" dirty="0" smtClean="0">
+                <a:sym typeface="Wingdings" panose="05000000000000000000" pitchFamily="2" charset="2"/>
+              </a:rPr>
+              <a:t>Only one transaction is allowed access to the data at a time</a:t>
+            </a:r>
+            <a:endParaRPr lang="en-US" dirty="0"/>
+          </a:p>
+        </p:txBody>
+      </p:sp>
+      <p:sp>
+        <p:nvSpPr>
           <p:cNvPr id="4" name="Slide Number Placeholder 3"/>
           <p:cNvSpPr>
             <a:spLocks noGrp="1"/>
@@ -10253,224 +10825,23 @@
           </a:p>
         </p:txBody>
       </p:sp>
-      <p:pic>
-        <p:nvPicPr>
-          <p:cNvPr id="6" name="Picture 5"/>
-          <p:cNvPicPr>
-            <a:picLocks noChangeAspect="1"/>
-          </p:cNvPicPr>
-          <p:nvPr/>
-        </p:nvPicPr>
-        <p:blipFill>
-          <a:blip r:embed="rId2"/>
-          <a:stretch>
-            <a:fillRect/>
-          </a:stretch>
-        </p:blipFill>
-        <p:spPr>
-          <a:xfrm>
-            <a:off x="539552" y="332656"/>
-            <a:ext cx="3629025" cy="5000625"/>
-          </a:xfrm>
-          <a:prstGeom prst="rect">
-            <a:avLst/>
-          </a:prstGeom>
-        </p:spPr>
-      </p:pic>
-      <p:sp>
-        <p:nvSpPr>
-          <p:cNvPr id="7" name="TextBox 6"/>
-          <p:cNvSpPr txBox="1"/>
-          <p:nvPr/>
-        </p:nvSpPr>
-        <p:spPr>
-          <a:xfrm>
-            <a:off x="611560" y="5445224"/>
-            <a:ext cx="3600400" cy="369332"/>
-          </a:xfrm>
-          <a:prstGeom prst="rect">
-            <a:avLst/>
-          </a:prstGeom>
-          <a:noFill/>
-        </p:spPr>
-        <p:txBody>
-          <a:bodyPr wrap="square" rtlCol="0">
-            <a:spAutoFit/>
-          </a:bodyPr>
-          <a:lstStyle/>
-          <a:p>
-            <a:pPr marL="0" lvl="1"/>
-            <a:r>
-              <a:rPr lang="en-US" dirty="0" smtClean="0">
-                <a:solidFill>
-                  <a:srgbClr val="0070C0"/>
-                </a:solidFill>
-                <a:sym typeface="Wingdings" panose="05000000000000000000" pitchFamily="2" charset="2"/>
-              </a:rPr>
-              <a:t>TransactionReadUncommitted</a:t>
-            </a:r>
-            <a:endParaRPr lang="en-US" dirty="0">
-              <a:solidFill>
-                <a:srgbClr val="0070C0"/>
-              </a:solidFill>
-              <a:sym typeface="Wingdings" panose="05000000000000000000" pitchFamily="2" charset="2"/>
-            </a:endParaRPr>
-          </a:p>
-        </p:txBody>
-      </p:sp>
-      <p:sp>
-        <p:nvSpPr>
-          <p:cNvPr id="8" name="Rectangle 7"/>
-          <p:cNvSpPr/>
-          <p:nvPr/>
-        </p:nvSpPr>
-        <p:spPr>
-          <a:xfrm>
-            <a:off x="445852" y="332656"/>
-            <a:ext cx="3816424" cy="5760640"/>
-          </a:xfrm>
-          <a:prstGeom prst="rect">
-            <a:avLst/>
-          </a:prstGeom>
-          <a:noFill/>
-          <a:ln w="3175"/>
-        </p:spPr>
-        <p:style>
-          <a:lnRef idx="2">
-            <a:schemeClr val="accent1">
-              <a:shade val="50000"/>
-            </a:schemeClr>
-          </a:lnRef>
-          <a:fillRef idx="1">
-            <a:schemeClr val="accent1"/>
-          </a:fillRef>
-          <a:effectRef idx="0">
-            <a:schemeClr val="accent1"/>
-          </a:effectRef>
-          <a:fontRef idx="minor">
-            <a:schemeClr val="lt1"/>
-          </a:fontRef>
-        </p:style>
-        <p:txBody>
-          <a:bodyPr rtlCol="0" anchor="ctr"/>
-          <a:lstStyle/>
-          <a:p>
-            <a:pPr algn="ctr"/>
-            <a:endParaRPr lang="en-US"/>
-          </a:p>
-        </p:txBody>
-      </p:sp>
-      <p:sp>
-        <p:nvSpPr>
-          <p:cNvPr id="9" name="Rectangle 8"/>
-          <p:cNvSpPr/>
-          <p:nvPr/>
-        </p:nvSpPr>
-        <p:spPr>
-          <a:xfrm>
-            <a:off x="4767534" y="335444"/>
-            <a:ext cx="3816424" cy="5760640"/>
-          </a:xfrm>
-          <a:prstGeom prst="rect">
-            <a:avLst/>
-          </a:prstGeom>
-          <a:noFill/>
-          <a:ln w="3175"/>
-        </p:spPr>
-        <p:style>
-          <a:lnRef idx="2">
-            <a:schemeClr val="accent1">
-              <a:shade val="50000"/>
-            </a:schemeClr>
-          </a:lnRef>
-          <a:fillRef idx="1">
-            <a:schemeClr val="accent1"/>
-          </a:fillRef>
-          <a:effectRef idx="0">
-            <a:schemeClr val="accent1"/>
-          </a:effectRef>
-          <a:fontRef idx="minor">
-            <a:schemeClr val="lt1"/>
-          </a:fontRef>
-        </p:style>
-        <p:txBody>
-          <a:bodyPr rtlCol="0" anchor="ctr"/>
-          <a:lstStyle/>
-          <a:p>
-            <a:pPr algn="ctr"/>
-            <a:endParaRPr lang="en-US"/>
-          </a:p>
-        </p:txBody>
-      </p:sp>
-      <p:pic>
-        <p:nvPicPr>
-          <p:cNvPr id="10" name="Picture 9"/>
-          <p:cNvPicPr>
-            <a:picLocks noChangeAspect="1"/>
-          </p:cNvPicPr>
-          <p:nvPr/>
-        </p:nvPicPr>
-        <p:blipFill>
-          <a:blip r:embed="rId3"/>
-          <a:stretch>
-            <a:fillRect/>
-          </a:stretch>
-        </p:blipFill>
-        <p:spPr>
-          <a:xfrm>
-            <a:off x="4848200" y="406074"/>
-            <a:ext cx="3655092" cy="4927207"/>
-          </a:xfrm>
-          <a:prstGeom prst="rect">
-            <a:avLst/>
-          </a:prstGeom>
-        </p:spPr>
-      </p:pic>
-      <p:sp>
-        <p:nvSpPr>
-          <p:cNvPr id="11" name="TextBox 10"/>
-          <p:cNvSpPr txBox="1"/>
-          <p:nvPr/>
-        </p:nvSpPr>
-        <p:spPr>
-          <a:xfrm>
-            <a:off x="5076056" y="5464444"/>
-            <a:ext cx="3600400" cy="369332"/>
-          </a:xfrm>
-          <a:prstGeom prst="rect">
-            <a:avLst/>
-          </a:prstGeom>
-          <a:noFill/>
-        </p:spPr>
-        <p:txBody>
-          <a:bodyPr wrap="square" rtlCol="0">
-            <a:spAutoFit/>
-          </a:bodyPr>
-          <a:lstStyle/>
-          <a:p>
-            <a:pPr marL="0" lvl="1"/>
-            <a:r>
-              <a:rPr lang="en-US" dirty="0">
-                <a:solidFill>
-                  <a:srgbClr val="0070C0"/>
-                </a:solidFill>
-                <a:sym typeface="Wingdings" panose="05000000000000000000" pitchFamily="2" charset="2"/>
-              </a:rPr>
-              <a:t>TransactionReadCommitted</a:t>
-            </a:r>
-          </a:p>
-        </p:txBody>
-      </p:sp>
     </p:spTree>
     <p:extLst>
       <p:ext uri="{BB962C8B-B14F-4D97-AF65-F5344CB8AC3E}">
-        <p14:creationId xmlns:p14="http://schemas.microsoft.com/office/powerpoint/2010/main" val="2138425649"/>
+        <p14:creationId xmlns:p14="http://schemas.microsoft.com/office/powerpoint/2010/main" val="2019302905"/>
       </p:ext>
     </p:extLst>
   </p:cSld>
   <p:clrMapOvr>
     <a:masterClrMapping/>
   </p:clrMapOvr>
+  <p:timing>
+    <p:tnLst>
+      <p:par>
+        <p:cTn id="1" dur="indefinite" restart="never" nodeType="tmRoot"/>
+      </p:par>
+    </p:tnLst>
+  </p:timing>
 </p:sld>
 </file>
 

</xml_diff>